<commit_message>
Conclusão Atividade 5 - Arquiteturas e Modificação da Apresentação Monkeys Healthcare powerpoint
</commit_message>
<xml_diff>
--- a/Apresentação MonkeysTest.pptx
+++ b/Apresentação MonkeysTest.pptx
@@ -3107,7 +3107,7 @@
         <p:spPr>
           <a:xfrm>
             <a:off x="2189410" y="2673826"/>
-            <a:ext cx="3996743" cy="1477328"/>
+            <a:ext cx="3996743" cy="1754326"/>
           </a:xfrm>
           <a:prstGeom prst="rect">
             <a:avLst/>
@@ -3171,7 +3171,19 @@
             </a:r>
             <a:r>
               <a:rPr lang="pt-BR" dirty="0" smtClean="0"/>
-              <a:t>Marketing. Pouco </a:t>
+              <a:t>Marketing (</a:t>
+            </a:r>
+            <a:r>
+              <a:rPr lang="pt-BR" dirty="0" err="1" smtClean="0"/>
+              <a:t>Unifamma</a:t>
+            </a:r>
+            <a:r>
+              <a:rPr lang="pt-BR" dirty="0" smtClean="0"/>
+              <a:t> – Maringá – PR). </a:t>
+            </a:r>
+            <a:r>
+              <a:rPr lang="pt-BR" dirty="0" smtClean="0"/>
+              <a:t>Pouco </a:t>
             </a:r>
             <a:r>
               <a:rPr lang="pt-BR" dirty="0"/>
@@ -3569,6 +3581,10 @@
               <a:rPr lang="pt-BR" b="1" dirty="0"/>
               <a:t> </a:t>
             </a:r>
+            <a:r>
+              <a:rPr lang="pt-BR" b="1" dirty="0" smtClean="0"/>
+              <a:t>anos</a:t>
+            </a:r>
             <a:endParaRPr lang="pt-BR" b="1" dirty="0" smtClean="0"/>
           </a:p>
           <a:p>
@@ -3583,6 +3599,73 @@
             <a:r>
               <a:rPr lang="pt-BR" dirty="0" smtClean="0"/>
               <a:t>IOS.</a:t>
+            </a:r>
+            <a:endParaRPr lang="pt-BR" dirty="0"/>
+          </a:p>
+        </p:txBody>
+      </p:sp>
+      <p:sp>
+        <p:nvSpPr>
+          <p:cNvPr id="15" name="Retângulo 14"/>
+          <p:cNvSpPr/>
+          <p:nvPr/>
+        </p:nvSpPr>
+        <p:spPr>
+          <a:xfrm>
+            <a:off x="7881869" y="4799783"/>
+            <a:ext cx="3996743" cy="1200329"/>
+          </a:xfrm>
+          <a:prstGeom prst="rect">
+            <a:avLst/>
+          </a:prstGeom>
+        </p:spPr>
+        <p:txBody>
+          <a:bodyPr wrap="square">
+            <a:spAutoFit/>
+          </a:bodyPr>
+          <a:lstStyle/>
+          <a:p>
+            <a:r>
+              <a:rPr lang="pt-BR" b="1" dirty="0"/>
+              <a:t>Nome: </a:t>
+            </a:r>
+            <a:r>
+              <a:rPr lang="pt-BR" dirty="0"/>
+              <a:t>Ramon de Jesus </a:t>
+            </a:r>
+            <a:endParaRPr lang="pt-BR" dirty="0" smtClean="0"/>
+          </a:p>
+          <a:p>
+            <a:r>
+              <a:rPr lang="pt-BR" b="1" dirty="0" smtClean="0"/>
+              <a:t>Idade</a:t>
+            </a:r>
+            <a:r>
+              <a:rPr lang="pt-BR" b="1" dirty="0"/>
+              <a:t>: </a:t>
+            </a:r>
+            <a:r>
+              <a:rPr lang="pt-BR" dirty="0" smtClean="0"/>
+              <a:t>21 anos</a:t>
+            </a:r>
+            <a:r>
+              <a:rPr lang="pt-BR" b="1" dirty="0" smtClean="0"/>
+              <a:t> </a:t>
+            </a:r>
+            <a:endParaRPr lang="pt-BR" b="1" dirty="0" smtClean="0"/>
+          </a:p>
+          <a:p>
+            <a:r>
+              <a:rPr lang="pt-BR" b="1" dirty="0" smtClean="0"/>
+              <a:t>Experiência/Formação</a:t>
+            </a:r>
+            <a:r>
+              <a:rPr lang="pt-BR" b="1" dirty="0" smtClean="0"/>
+              <a:t>: </a:t>
+            </a:r>
+            <a:r>
+              <a:rPr lang="pt-BR" dirty="0" smtClean="0"/>
+              <a:t>Primeiro contato com tecnologia.</a:t>
             </a:r>
             <a:endParaRPr lang="pt-BR" dirty="0"/>
           </a:p>

</xml_diff>

<commit_message>
Atualização Apresentação Projeto Powerpoint, Criação dos protótipos de tela (web e mobile)
</commit_message>
<xml_diff>
--- a/Apresentação MonkeysTest.pptx
+++ b/Apresentação MonkeysTest.pptx
@@ -9,8 +9,12 @@
     <p:sldId id="262" r:id="rId3"/>
     <p:sldId id="257" r:id="rId4"/>
     <p:sldId id="261" r:id="rId5"/>
-    <p:sldId id="259" r:id="rId6"/>
-    <p:sldId id="260" r:id="rId7"/>
+    <p:sldId id="260" r:id="rId6"/>
+    <p:sldId id="259" r:id="rId7"/>
+    <p:sldId id="263" r:id="rId8"/>
+    <p:sldId id="265" r:id="rId9"/>
+    <p:sldId id="264" r:id="rId10"/>
+    <p:sldId id="266" r:id="rId11"/>
   </p:sldIdLst>
   <p:sldSz cx="12192000" cy="6858000"/>
   <p:notesSz cx="6858000" cy="9144000"/>
@@ -248,7 +252,7 @@
           <a:p>
             <a:fld id="{9C0D9546-5F13-4627-99F6-4F002E8E13FB}" type="datetimeFigureOut">
               <a:rPr lang="pt-BR" smtClean="0"/>
-              <a:t>09/10/2018</a:t>
+              <a:t>10/10/2018</a:t>
             </a:fld>
             <a:endParaRPr lang="pt-BR"/>
           </a:p>
@@ -418,7 +422,7 @@
           <a:p>
             <a:fld id="{9C0D9546-5F13-4627-99F6-4F002E8E13FB}" type="datetimeFigureOut">
               <a:rPr lang="pt-BR" smtClean="0"/>
-              <a:t>09/10/2018</a:t>
+              <a:t>10/10/2018</a:t>
             </a:fld>
             <a:endParaRPr lang="pt-BR"/>
           </a:p>
@@ -598,7 +602,7 @@
           <a:p>
             <a:fld id="{9C0D9546-5F13-4627-99F6-4F002E8E13FB}" type="datetimeFigureOut">
               <a:rPr lang="pt-BR" smtClean="0"/>
-              <a:t>09/10/2018</a:t>
+              <a:t>10/10/2018</a:t>
             </a:fld>
             <a:endParaRPr lang="pt-BR"/>
           </a:p>
@@ -768,7 +772,7 @@
           <a:p>
             <a:fld id="{9C0D9546-5F13-4627-99F6-4F002E8E13FB}" type="datetimeFigureOut">
               <a:rPr lang="pt-BR" smtClean="0"/>
-              <a:t>09/10/2018</a:t>
+              <a:t>10/10/2018</a:t>
             </a:fld>
             <a:endParaRPr lang="pt-BR"/>
           </a:p>
@@ -1014,7 +1018,7 @@
           <a:p>
             <a:fld id="{9C0D9546-5F13-4627-99F6-4F002E8E13FB}" type="datetimeFigureOut">
               <a:rPr lang="pt-BR" smtClean="0"/>
-              <a:t>09/10/2018</a:t>
+              <a:t>10/10/2018</a:t>
             </a:fld>
             <a:endParaRPr lang="pt-BR"/>
           </a:p>
@@ -1246,7 +1250,7 @@
           <a:p>
             <a:fld id="{9C0D9546-5F13-4627-99F6-4F002E8E13FB}" type="datetimeFigureOut">
               <a:rPr lang="pt-BR" smtClean="0"/>
-              <a:t>09/10/2018</a:t>
+              <a:t>10/10/2018</a:t>
             </a:fld>
             <a:endParaRPr lang="pt-BR"/>
           </a:p>
@@ -1613,7 +1617,7 @@
           <a:p>
             <a:fld id="{9C0D9546-5F13-4627-99F6-4F002E8E13FB}" type="datetimeFigureOut">
               <a:rPr lang="pt-BR" smtClean="0"/>
-              <a:t>09/10/2018</a:t>
+              <a:t>10/10/2018</a:t>
             </a:fld>
             <a:endParaRPr lang="pt-BR"/>
           </a:p>
@@ -1731,7 +1735,7 @@
           <a:p>
             <a:fld id="{9C0D9546-5F13-4627-99F6-4F002E8E13FB}" type="datetimeFigureOut">
               <a:rPr lang="pt-BR" smtClean="0"/>
-              <a:t>09/10/2018</a:t>
+              <a:t>10/10/2018</a:t>
             </a:fld>
             <a:endParaRPr lang="pt-BR"/>
           </a:p>
@@ -1826,7 +1830,7 @@
           <a:p>
             <a:fld id="{9C0D9546-5F13-4627-99F6-4F002E8E13FB}" type="datetimeFigureOut">
               <a:rPr lang="pt-BR" smtClean="0"/>
-              <a:t>09/10/2018</a:t>
+              <a:t>10/10/2018</a:t>
             </a:fld>
             <a:endParaRPr lang="pt-BR"/>
           </a:p>
@@ -2103,7 +2107,7 @@
           <a:p>
             <a:fld id="{9C0D9546-5F13-4627-99F6-4F002E8E13FB}" type="datetimeFigureOut">
               <a:rPr lang="pt-BR" smtClean="0"/>
-              <a:t>09/10/2018</a:t>
+              <a:t>10/10/2018</a:t>
             </a:fld>
             <a:endParaRPr lang="pt-BR"/>
           </a:p>
@@ -2356,7 +2360,7 @@
           <a:p>
             <a:fld id="{9C0D9546-5F13-4627-99F6-4F002E8E13FB}" type="datetimeFigureOut">
               <a:rPr lang="pt-BR" smtClean="0"/>
-              <a:t>09/10/2018</a:t>
+              <a:t>10/10/2018</a:t>
             </a:fld>
             <a:endParaRPr lang="pt-BR"/>
           </a:p>
@@ -2569,7 +2573,7 @@
           <a:p>
             <a:fld id="{9C0D9546-5F13-4627-99F6-4F002E8E13FB}" type="datetimeFigureOut">
               <a:rPr lang="pt-BR" smtClean="0"/>
-              <a:t>09/10/2018</a:t>
+              <a:t>10/10/2018</a:t>
             </a:fld>
             <a:endParaRPr lang="pt-BR"/>
           </a:p>
@@ -3081,6 +3085,2201 @@
 </p:sld>
 </file>
 
+<file path=ppt/slides/slide10.xml><?xml version="1.0" encoding="utf-8"?>
+<p:sld xmlns:a="http://schemas.openxmlformats.org/drawingml/2006/main" xmlns:r="http://schemas.openxmlformats.org/officeDocument/2006/relationships" xmlns:p="http://schemas.openxmlformats.org/presentationml/2006/main">
+  <p:cSld>
+    <p:spTree>
+      <p:nvGrpSpPr>
+        <p:cNvPr id="1" name=""/>
+        <p:cNvGrpSpPr/>
+        <p:nvPr/>
+      </p:nvGrpSpPr>
+      <p:grpSpPr>
+        <a:xfrm>
+          <a:off x="0" y="0"/>
+          <a:ext cx="0" cy="0"/>
+          <a:chOff x="0" y="0"/>
+          <a:chExt cx="0" cy="0"/>
+        </a:xfrm>
+      </p:grpSpPr>
+      <p:sp>
+        <p:nvSpPr>
+          <p:cNvPr id="4" name="CaixaDeTexto 3"/>
+          <p:cNvSpPr txBox="1"/>
+          <p:nvPr/>
+        </p:nvSpPr>
+        <p:spPr>
+          <a:xfrm>
+            <a:off x="3787184" y="0"/>
+            <a:ext cx="4617633" cy="769441"/>
+          </a:xfrm>
+          <a:prstGeom prst="rect">
+            <a:avLst/>
+          </a:prstGeom>
+          <a:noFill/>
+        </p:spPr>
+        <p:txBody>
+          <a:bodyPr wrap="square" rtlCol="0">
+            <a:spAutoFit/>
+          </a:bodyPr>
+          <a:lstStyle/>
+          <a:p>
+            <a:r>
+              <a:rPr lang="pt-BR" sz="4400" b="1" u="sng" dirty="0" smtClean="0">
+                <a:solidFill>
+                  <a:prstClr val="black"/>
+                </a:solidFill>
+                <a:effectLst>
+                  <a:outerShdw blurRad="38100" dist="38100" dir="2700000" algn="tl">
+                    <a:srgbClr val="000000">
+                      <a:alpha val="43137"/>
+                    </a:srgbClr>
+                  </a:outerShdw>
+                </a:effectLst>
+              </a:rPr>
+              <a:t>Protótipos de Telas</a:t>
+            </a:r>
+            <a:endParaRPr lang="pt-BR" sz="4400" b="1" u="sng" dirty="0">
+              <a:solidFill>
+                <a:prstClr val="black"/>
+              </a:solidFill>
+              <a:effectLst>
+                <a:outerShdw blurRad="38100" dist="38100" dir="2700000" algn="tl">
+                  <a:srgbClr val="000000">
+                    <a:alpha val="43137"/>
+                  </a:srgbClr>
+                </a:outerShdw>
+              </a:effectLst>
+            </a:endParaRPr>
+          </a:p>
+        </p:txBody>
+      </p:sp>
+      <p:sp>
+        <p:nvSpPr>
+          <p:cNvPr id="5" name="CaixaDeTexto 4"/>
+          <p:cNvSpPr txBox="1"/>
+          <p:nvPr/>
+        </p:nvSpPr>
+        <p:spPr>
+          <a:xfrm>
+            <a:off x="5323192" y="596275"/>
+            <a:ext cx="1545616" cy="646331"/>
+          </a:xfrm>
+          <a:prstGeom prst="rect">
+            <a:avLst/>
+          </a:prstGeom>
+          <a:noFill/>
+        </p:spPr>
+        <p:txBody>
+          <a:bodyPr wrap="none" rtlCol="0">
+            <a:spAutoFit/>
+          </a:bodyPr>
+          <a:lstStyle/>
+          <a:p>
+            <a:r>
+              <a:rPr lang="pt-BR" sz="3600" b="1" dirty="0" smtClean="0">
+                <a:effectLst>
+                  <a:outerShdw blurRad="38100" dist="38100" dir="2700000" algn="tl">
+                    <a:srgbClr val="000000">
+                      <a:alpha val="43137"/>
+                    </a:srgbClr>
+                  </a:outerShdw>
+                </a:effectLst>
+              </a:rPr>
+              <a:t>Mobile</a:t>
+            </a:r>
+            <a:endParaRPr lang="pt-BR" sz="3600" b="1" dirty="0">
+              <a:effectLst>
+                <a:outerShdw blurRad="38100" dist="38100" dir="2700000" algn="tl">
+                  <a:srgbClr val="000000">
+                    <a:alpha val="43137"/>
+                  </a:srgbClr>
+                </a:outerShdw>
+              </a:effectLst>
+            </a:endParaRPr>
+          </a:p>
+        </p:txBody>
+      </p:sp>
+      <p:grpSp>
+        <p:nvGrpSpPr>
+          <p:cNvPr id="56" name="Agrupar 67"/>
+          <p:cNvGrpSpPr/>
+          <p:nvPr/>
+        </p:nvGrpSpPr>
+        <p:grpSpPr>
+          <a:xfrm>
+            <a:off x="1388922" y="775028"/>
+            <a:ext cx="3578671" cy="6050779"/>
+            <a:chOff x="1257300" y="190500"/>
+            <a:chExt cx="3860800" cy="6527800"/>
+          </a:xfrm>
+        </p:grpSpPr>
+        <p:sp>
+          <p:nvSpPr>
+            <p:cNvPr id="57" name="Retângulo Arredondado 3"/>
+            <p:cNvSpPr/>
+            <p:nvPr/>
+          </p:nvSpPr>
+          <p:spPr>
+            <a:xfrm>
+              <a:off x="1257300" y="190500"/>
+              <a:ext cx="3860800" cy="6527800"/>
+            </a:xfrm>
+            <a:prstGeom prst="roundRect">
+              <a:avLst/>
+            </a:prstGeom>
+            <a:solidFill>
+              <a:schemeClr val="tx1"/>
+            </a:solidFill>
+          </p:spPr>
+          <p:style>
+            <a:lnRef idx="2">
+              <a:schemeClr val="accent1">
+                <a:shade val="50000"/>
+              </a:schemeClr>
+            </a:lnRef>
+            <a:fillRef idx="1">
+              <a:schemeClr val="accent1"/>
+            </a:fillRef>
+            <a:effectRef idx="0">
+              <a:schemeClr val="accent1"/>
+            </a:effectRef>
+            <a:fontRef idx="minor">
+              <a:schemeClr val="lt1"/>
+            </a:fontRef>
+          </p:style>
+          <p:txBody>
+            <a:bodyPr rtlCol="0" anchor="ctr"/>
+            <a:lstStyle/>
+            <a:p>
+              <a:pPr algn="ctr"/>
+              <a:r>
+                <a:rPr lang="pt-BR" dirty="0" smtClean="0">
+                  <a:solidFill>
+                    <a:prstClr val="white"/>
+                  </a:solidFill>
+                </a:rPr>
+                <a:t>temperatura</a:t>
+              </a:r>
+              <a:endParaRPr lang="pt-BR" dirty="0">
+                <a:solidFill>
+                  <a:prstClr val="white"/>
+                </a:solidFill>
+              </a:endParaRPr>
+            </a:p>
+          </p:txBody>
+        </p:sp>
+        <p:sp>
+          <p:nvSpPr>
+            <p:cNvPr id="58" name="Retângulo 57"/>
+            <p:cNvSpPr/>
+            <p:nvPr/>
+          </p:nvSpPr>
+          <p:spPr>
+            <a:xfrm>
+              <a:off x="1689100" y="698500"/>
+              <a:ext cx="3009900" cy="5461000"/>
+            </a:xfrm>
+            <a:prstGeom prst="rect">
+              <a:avLst/>
+            </a:prstGeom>
+            <a:solidFill>
+              <a:schemeClr val="bg1"/>
+            </a:solidFill>
+          </p:spPr>
+          <p:style>
+            <a:lnRef idx="2">
+              <a:schemeClr val="accent1">
+                <a:shade val="50000"/>
+              </a:schemeClr>
+            </a:lnRef>
+            <a:fillRef idx="1">
+              <a:schemeClr val="accent1"/>
+            </a:fillRef>
+            <a:effectRef idx="0">
+              <a:schemeClr val="accent1"/>
+            </a:effectRef>
+            <a:fontRef idx="minor">
+              <a:schemeClr val="lt1"/>
+            </a:fontRef>
+          </p:style>
+          <p:txBody>
+            <a:bodyPr rtlCol="0" anchor="ctr"/>
+            <a:lstStyle/>
+            <a:p>
+              <a:pPr algn="ctr"/>
+              <a:endParaRPr lang="pt-BR">
+                <a:solidFill>
+                  <a:prstClr val="white"/>
+                </a:solidFill>
+              </a:endParaRPr>
+            </a:p>
+          </p:txBody>
+        </p:sp>
+        <p:sp>
+          <p:nvSpPr>
+            <p:cNvPr id="59" name="Elipse 58"/>
+            <p:cNvSpPr/>
+            <p:nvPr/>
+          </p:nvSpPr>
+          <p:spPr>
+            <a:xfrm>
+              <a:off x="2921000" y="6248400"/>
+              <a:ext cx="431800" cy="406400"/>
+            </a:xfrm>
+            <a:prstGeom prst="ellipse">
+              <a:avLst/>
+            </a:prstGeom>
+            <a:solidFill>
+              <a:schemeClr val="bg1"/>
+            </a:solidFill>
+          </p:spPr>
+          <p:style>
+            <a:lnRef idx="2">
+              <a:schemeClr val="accent1">
+                <a:shade val="50000"/>
+              </a:schemeClr>
+            </a:lnRef>
+            <a:fillRef idx="1">
+              <a:schemeClr val="accent1"/>
+            </a:fillRef>
+            <a:effectRef idx="0">
+              <a:schemeClr val="accent1"/>
+            </a:effectRef>
+            <a:fontRef idx="minor">
+              <a:schemeClr val="lt1"/>
+            </a:fontRef>
+          </p:style>
+          <p:txBody>
+            <a:bodyPr rtlCol="0" anchor="ctr"/>
+            <a:lstStyle/>
+            <a:p>
+              <a:pPr algn="ctr"/>
+              <a:endParaRPr lang="pt-BR">
+                <a:solidFill>
+                  <a:prstClr val="white"/>
+                </a:solidFill>
+              </a:endParaRPr>
+            </a:p>
+          </p:txBody>
+        </p:sp>
+        <p:cxnSp>
+          <p:nvCxnSpPr>
+            <p:cNvPr id="60" name="Conector reto 59"/>
+            <p:cNvCxnSpPr/>
+            <p:nvPr/>
+          </p:nvCxnSpPr>
+          <p:spPr>
+            <a:xfrm>
+              <a:off x="2819400" y="482600"/>
+              <a:ext cx="800100" cy="0"/>
+            </a:xfrm>
+            <a:prstGeom prst="line">
+              <a:avLst/>
+            </a:prstGeom>
+            <a:ln>
+              <a:solidFill>
+                <a:schemeClr val="bg1"/>
+              </a:solidFill>
+            </a:ln>
+          </p:spPr>
+          <p:style>
+            <a:lnRef idx="1">
+              <a:schemeClr val="accent1"/>
+            </a:lnRef>
+            <a:fillRef idx="0">
+              <a:schemeClr val="accent1"/>
+            </a:fillRef>
+            <a:effectRef idx="0">
+              <a:schemeClr val="accent1"/>
+            </a:effectRef>
+            <a:fontRef idx="minor">
+              <a:schemeClr val="tx1"/>
+            </a:fontRef>
+          </p:style>
+        </p:cxnSp>
+        <p:sp>
+          <p:nvSpPr>
+            <p:cNvPr id="61" name="Fluxograma: Conector 60"/>
+            <p:cNvSpPr/>
+            <p:nvPr/>
+          </p:nvSpPr>
+          <p:spPr>
+            <a:xfrm flipV="1">
+              <a:off x="2476500" y="419100"/>
+              <a:ext cx="127000" cy="88900"/>
+            </a:xfrm>
+            <a:prstGeom prst="flowChartConnector">
+              <a:avLst/>
+            </a:prstGeom>
+            <a:solidFill>
+              <a:schemeClr val="bg1"/>
+            </a:solidFill>
+            <a:ln>
+              <a:solidFill>
+                <a:schemeClr val="bg1"/>
+              </a:solidFill>
+            </a:ln>
+          </p:spPr>
+          <p:style>
+            <a:lnRef idx="2">
+              <a:schemeClr val="accent1">
+                <a:shade val="50000"/>
+              </a:schemeClr>
+            </a:lnRef>
+            <a:fillRef idx="1">
+              <a:schemeClr val="accent1"/>
+            </a:fillRef>
+            <a:effectRef idx="0">
+              <a:schemeClr val="accent1"/>
+            </a:effectRef>
+            <a:fontRef idx="minor">
+              <a:schemeClr val="lt1"/>
+            </a:fontRef>
+          </p:style>
+          <p:txBody>
+            <a:bodyPr rtlCol="0" anchor="ctr"/>
+            <a:lstStyle/>
+            <a:p>
+              <a:pPr algn="ctr"/>
+              <a:endParaRPr lang="pt-BR">
+                <a:solidFill>
+                  <a:prstClr val="white"/>
+                </a:solidFill>
+              </a:endParaRPr>
+            </a:p>
+          </p:txBody>
+        </p:sp>
+        <p:pic>
+          <p:nvPicPr>
+            <p:cNvPr id="62" name="Imagem 61"/>
+            <p:cNvPicPr>
+              <a:picLocks noChangeAspect="1"/>
+            </p:cNvPicPr>
+            <p:nvPr/>
+          </p:nvPicPr>
+          <p:blipFill>
+            <a:blip r:embed="rId2" cstate="print">
+              <a:extLst>
+                <a:ext uri="{28A0092B-C50C-407E-A947-70E740481C1C}">
+                  <a14:useLocalDpi xmlns:a14="http://schemas.microsoft.com/office/drawing/2010/main" val="0"/>
+                </a:ext>
+              </a:extLst>
+            </a:blip>
+            <a:stretch>
+              <a:fillRect/>
+            </a:stretch>
+          </p:blipFill>
+          <p:spPr>
+            <a:xfrm>
+              <a:off x="1849721" y="2341629"/>
+              <a:ext cx="2675954" cy="1162367"/>
+            </a:xfrm>
+            <a:prstGeom prst="rect">
+              <a:avLst/>
+            </a:prstGeom>
+          </p:spPr>
+        </p:pic>
+        <p:sp>
+          <p:nvSpPr>
+            <p:cNvPr id="63" name="Retângulo 62"/>
+            <p:cNvSpPr/>
+            <p:nvPr/>
+          </p:nvSpPr>
+          <p:spPr>
+            <a:xfrm>
+              <a:off x="1765004" y="3561907"/>
+              <a:ext cx="2849526" cy="2243470"/>
+            </a:xfrm>
+            <a:prstGeom prst="rect">
+              <a:avLst/>
+            </a:prstGeom>
+            <a:solidFill>
+              <a:schemeClr val="bg1"/>
+            </a:solidFill>
+            <a:ln>
+              <a:solidFill>
+                <a:schemeClr val="bg1">
+                  <a:lumMod val="50000"/>
+                </a:schemeClr>
+              </a:solidFill>
+            </a:ln>
+          </p:spPr>
+          <p:style>
+            <a:lnRef idx="2">
+              <a:schemeClr val="accent1">
+                <a:shade val="50000"/>
+              </a:schemeClr>
+            </a:lnRef>
+            <a:fillRef idx="1">
+              <a:schemeClr val="accent1"/>
+            </a:fillRef>
+            <a:effectRef idx="0">
+              <a:schemeClr val="accent1"/>
+            </a:effectRef>
+            <a:fontRef idx="minor">
+              <a:schemeClr val="lt1"/>
+            </a:fontRef>
+          </p:style>
+          <p:txBody>
+            <a:bodyPr rtlCol="0" anchor="ctr"/>
+            <a:lstStyle/>
+            <a:p>
+              <a:pPr algn="ctr"/>
+              <a:endParaRPr lang="pt-BR" dirty="0">
+                <a:solidFill>
+                  <a:prstClr val="white">
+                    <a:lumMod val="50000"/>
+                  </a:prstClr>
+                </a:solidFill>
+              </a:endParaRPr>
+            </a:p>
+          </p:txBody>
+        </p:sp>
+        <p:cxnSp>
+          <p:nvCxnSpPr>
+            <p:cNvPr id="64" name="Conector reto 63"/>
+            <p:cNvCxnSpPr/>
+            <p:nvPr/>
+          </p:nvCxnSpPr>
+          <p:spPr>
+            <a:xfrm>
+              <a:off x="1775637" y="3987209"/>
+              <a:ext cx="2838893" cy="0"/>
+            </a:xfrm>
+            <a:prstGeom prst="line">
+              <a:avLst/>
+            </a:prstGeom>
+            <a:ln>
+              <a:solidFill>
+                <a:srgbClr val="C00000"/>
+              </a:solidFill>
+            </a:ln>
+          </p:spPr>
+          <p:style>
+            <a:lnRef idx="1">
+              <a:schemeClr val="accent1"/>
+            </a:lnRef>
+            <a:fillRef idx="0">
+              <a:schemeClr val="accent1"/>
+            </a:fillRef>
+            <a:effectRef idx="0">
+              <a:schemeClr val="accent1"/>
+            </a:effectRef>
+            <a:fontRef idx="minor">
+              <a:schemeClr val="tx1"/>
+            </a:fontRef>
+          </p:style>
+        </p:cxnSp>
+        <p:cxnSp>
+          <p:nvCxnSpPr>
+            <p:cNvPr id="65" name="Conector reto 64"/>
+            <p:cNvCxnSpPr/>
+            <p:nvPr/>
+          </p:nvCxnSpPr>
+          <p:spPr>
+            <a:xfrm>
+              <a:off x="1775637" y="4447951"/>
+              <a:ext cx="2838893" cy="0"/>
+            </a:xfrm>
+            <a:prstGeom prst="line">
+              <a:avLst/>
+            </a:prstGeom>
+            <a:ln>
+              <a:solidFill>
+                <a:srgbClr val="C00000"/>
+              </a:solidFill>
+            </a:ln>
+          </p:spPr>
+          <p:style>
+            <a:lnRef idx="1">
+              <a:schemeClr val="accent1"/>
+            </a:lnRef>
+            <a:fillRef idx="0">
+              <a:schemeClr val="accent1"/>
+            </a:fillRef>
+            <a:effectRef idx="0">
+              <a:schemeClr val="accent1"/>
+            </a:effectRef>
+            <a:fontRef idx="minor">
+              <a:schemeClr val="tx1"/>
+            </a:fontRef>
+          </p:style>
+        </p:cxnSp>
+        <p:sp>
+          <p:nvSpPr>
+            <p:cNvPr id="66" name="CaixaDeTexto 65"/>
+            <p:cNvSpPr txBox="1"/>
+            <p:nvPr/>
+          </p:nvSpPr>
+          <p:spPr>
+            <a:xfrm>
+              <a:off x="1765004" y="3668233"/>
+              <a:ext cx="1054397" cy="406149"/>
+            </a:xfrm>
+            <a:prstGeom prst="rect">
+              <a:avLst/>
+            </a:prstGeom>
+            <a:noFill/>
+          </p:spPr>
+          <p:txBody>
+            <a:bodyPr wrap="square" rtlCol="0">
+              <a:spAutoFit/>
+            </a:bodyPr>
+            <a:lstStyle/>
+            <a:p>
+              <a:r>
+                <a:rPr lang="pt-BR" dirty="0" smtClean="0">
+                  <a:solidFill>
+                    <a:prstClr val="white">
+                      <a:lumMod val="50000"/>
+                    </a:prstClr>
+                  </a:solidFill>
+                </a:rPr>
+                <a:t>Usuário</a:t>
+              </a:r>
+              <a:endParaRPr lang="pt-BR" dirty="0">
+                <a:solidFill>
+                  <a:prstClr val="white">
+                    <a:lumMod val="50000"/>
+                  </a:prstClr>
+                </a:solidFill>
+              </a:endParaRPr>
+            </a:p>
+          </p:txBody>
+        </p:sp>
+        <p:sp>
+          <p:nvSpPr>
+            <p:cNvPr id="67" name="CaixaDeTexto 66"/>
+            <p:cNvSpPr txBox="1"/>
+            <p:nvPr/>
+          </p:nvSpPr>
+          <p:spPr>
+            <a:xfrm>
+              <a:off x="1779856" y="4124856"/>
+              <a:ext cx="760144" cy="369332"/>
+            </a:xfrm>
+            <a:prstGeom prst="rect">
+              <a:avLst/>
+            </a:prstGeom>
+            <a:noFill/>
+          </p:spPr>
+          <p:txBody>
+            <a:bodyPr wrap="none" rtlCol="0">
+              <a:spAutoFit/>
+            </a:bodyPr>
+            <a:lstStyle/>
+            <a:p>
+              <a:r>
+                <a:rPr lang="pt-BR" dirty="0" smtClean="0">
+                  <a:solidFill>
+                    <a:prstClr val="white">
+                      <a:lumMod val="50000"/>
+                    </a:prstClr>
+                  </a:solidFill>
+                </a:rPr>
+                <a:t>Senha</a:t>
+              </a:r>
+              <a:endParaRPr lang="pt-BR" dirty="0">
+                <a:solidFill>
+                  <a:prstClr val="white">
+                    <a:lumMod val="50000"/>
+                  </a:prstClr>
+                </a:solidFill>
+              </a:endParaRPr>
+            </a:p>
+          </p:txBody>
+        </p:sp>
+        <p:sp>
+          <p:nvSpPr>
+            <p:cNvPr id="68" name="Retângulo 67"/>
+            <p:cNvSpPr/>
+            <p:nvPr/>
+          </p:nvSpPr>
+          <p:spPr>
+            <a:xfrm>
+              <a:off x="1856073" y="4525776"/>
+              <a:ext cx="2675954" cy="258874"/>
+            </a:xfrm>
+            <a:prstGeom prst="rect">
+              <a:avLst/>
+            </a:prstGeom>
+            <a:solidFill>
+              <a:srgbClr val="C00000"/>
+            </a:solidFill>
+            <a:ln>
+              <a:solidFill>
+                <a:srgbClr val="C00000"/>
+              </a:solidFill>
+            </a:ln>
+          </p:spPr>
+          <p:style>
+            <a:lnRef idx="2">
+              <a:schemeClr val="accent1"/>
+            </a:lnRef>
+            <a:fillRef idx="1">
+              <a:schemeClr val="lt1"/>
+            </a:fillRef>
+            <a:effectRef idx="0">
+              <a:schemeClr val="accent1"/>
+            </a:effectRef>
+            <a:fontRef idx="minor">
+              <a:schemeClr val="dk1"/>
+            </a:fontRef>
+          </p:style>
+          <p:txBody>
+            <a:bodyPr rtlCol="0" anchor="ctr"/>
+            <a:lstStyle/>
+            <a:p>
+              <a:pPr algn="ctr"/>
+              <a:r>
+                <a:rPr lang="pt-BR" sz="1400" dirty="0" smtClean="0">
+                  <a:solidFill>
+                    <a:prstClr val="white"/>
+                  </a:solidFill>
+                </a:rPr>
+                <a:t>Entrar</a:t>
+              </a:r>
+              <a:endParaRPr lang="pt-BR" sz="1400" dirty="0">
+                <a:solidFill>
+                  <a:prstClr val="white"/>
+                </a:solidFill>
+              </a:endParaRPr>
+            </a:p>
+          </p:txBody>
+        </p:sp>
+        <p:sp>
+          <p:nvSpPr>
+            <p:cNvPr id="69" name="CaixaDeTexto 68"/>
+            <p:cNvSpPr txBox="1"/>
+            <p:nvPr/>
+          </p:nvSpPr>
+          <p:spPr>
+            <a:xfrm>
+              <a:off x="2106805" y="4805916"/>
+              <a:ext cx="2225289" cy="276999"/>
+            </a:xfrm>
+            <a:prstGeom prst="rect">
+              <a:avLst/>
+            </a:prstGeom>
+            <a:noFill/>
+          </p:spPr>
+          <p:txBody>
+            <a:bodyPr wrap="none" rtlCol="0">
+              <a:spAutoFit/>
+            </a:bodyPr>
+            <a:lstStyle/>
+            <a:p>
+              <a:r>
+                <a:rPr lang="pt-BR" sz="1200" dirty="0" smtClean="0">
+                  <a:solidFill>
+                    <a:prstClr val="white">
+                      <a:lumMod val="50000"/>
+                    </a:prstClr>
+                  </a:solidFill>
+                </a:rPr>
+                <a:t>Esqueceu seus dados de acesso?</a:t>
+              </a:r>
+              <a:endParaRPr lang="pt-BR" sz="1200" dirty="0">
+                <a:solidFill>
+                  <a:prstClr val="white">
+                    <a:lumMod val="50000"/>
+                  </a:prstClr>
+                </a:solidFill>
+              </a:endParaRPr>
+            </a:p>
+          </p:txBody>
+        </p:sp>
+        <p:sp>
+          <p:nvSpPr>
+            <p:cNvPr id="70" name="CaixaDeTexto 69"/>
+            <p:cNvSpPr txBox="1"/>
+            <p:nvPr/>
+          </p:nvSpPr>
+          <p:spPr>
+            <a:xfrm>
+              <a:off x="2268441" y="4996567"/>
+              <a:ext cx="1838517" cy="276999"/>
+            </a:xfrm>
+            <a:prstGeom prst="rect">
+              <a:avLst/>
+            </a:prstGeom>
+            <a:noFill/>
+          </p:spPr>
+          <p:txBody>
+            <a:bodyPr wrap="none" rtlCol="0">
+              <a:spAutoFit/>
+            </a:bodyPr>
+            <a:lstStyle/>
+            <a:p>
+              <a:r>
+                <a:rPr lang="pt-BR" sz="1200" dirty="0" smtClean="0">
+                  <a:solidFill>
+                    <a:srgbClr val="C00000"/>
+                  </a:solidFill>
+                </a:rPr>
+                <a:t>Obtenha ajuda para entrar</a:t>
+              </a:r>
+              <a:endParaRPr lang="pt-BR" sz="1200" dirty="0">
+                <a:solidFill>
+                  <a:srgbClr val="C00000"/>
+                </a:solidFill>
+              </a:endParaRPr>
+            </a:p>
+          </p:txBody>
+        </p:sp>
+        <p:sp>
+          <p:nvSpPr>
+            <p:cNvPr id="71" name="CaixaDeTexto 70"/>
+            <p:cNvSpPr txBox="1"/>
+            <p:nvPr/>
+          </p:nvSpPr>
+          <p:spPr>
+            <a:xfrm>
+              <a:off x="2963615" y="5241574"/>
+              <a:ext cx="346570" cy="276999"/>
+            </a:xfrm>
+            <a:prstGeom prst="rect">
+              <a:avLst/>
+            </a:prstGeom>
+            <a:noFill/>
+          </p:spPr>
+          <p:txBody>
+            <a:bodyPr wrap="none" rtlCol="0">
+              <a:spAutoFit/>
+            </a:bodyPr>
+            <a:lstStyle/>
+            <a:p>
+              <a:r>
+                <a:rPr lang="pt-BR" sz="1200" dirty="0" smtClean="0">
+                  <a:solidFill>
+                    <a:prstClr val="white">
+                      <a:lumMod val="50000"/>
+                    </a:prstClr>
+                  </a:solidFill>
+                </a:rPr>
+                <a:t>ou</a:t>
+              </a:r>
+              <a:endParaRPr lang="pt-BR" sz="1200" dirty="0">
+                <a:solidFill>
+                  <a:prstClr val="white">
+                    <a:lumMod val="50000"/>
+                  </a:prstClr>
+                </a:solidFill>
+              </a:endParaRPr>
+            </a:p>
+          </p:txBody>
+        </p:sp>
+        <p:cxnSp>
+          <p:nvCxnSpPr>
+            <p:cNvPr id="72" name="Conector reto 71"/>
+            <p:cNvCxnSpPr/>
+            <p:nvPr/>
+          </p:nvCxnSpPr>
+          <p:spPr>
+            <a:xfrm>
+              <a:off x="1765004" y="5380074"/>
+              <a:ext cx="1275908" cy="0"/>
+            </a:xfrm>
+            <a:prstGeom prst="line">
+              <a:avLst/>
+            </a:prstGeom>
+            <a:ln>
+              <a:solidFill>
+                <a:schemeClr val="bg1">
+                  <a:lumMod val="50000"/>
+                </a:schemeClr>
+              </a:solidFill>
+            </a:ln>
+          </p:spPr>
+          <p:style>
+            <a:lnRef idx="1">
+              <a:schemeClr val="accent1"/>
+            </a:lnRef>
+            <a:fillRef idx="0">
+              <a:schemeClr val="accent1"/>
+            </a:fillRef>
+            <a:effectRef idx="0">
+              <a:schemeClr val="accent1"/>
+            </a:effectRef>
+            <a:fontRef idx="minor">
+              <a:schemeClr val="tx1"/>
+            </a:fontRef>
+          </p:style>
+        </p:cxnSp>
+        <p:cxnSp>
+          <p:nvCxnSpPr>
+            <p:cNvPr id="73" name="Conector reto 72"/>
+            <p:cNvCxnSpPr/>
+            <p:nvPr/>
+          </p:nvCxnSpPr>
+          <p:spPr>
+            <a:xfrm flipV="1">
+              <a:off x="3214488" y="5380073"/>
+              <a:ext cx="1400042" cy="2"/>
+            </a:xfrm>
+            <a:prstGeom prst="line">
+              <a:avLst/>
+            </a:prstGeom>
+            <a:ln>
+              <a:solidFill>
+                <a:schemeClr val="bg1">
+                  <a:lumMod val="50000"/>
+                </a:schemeClr>
+              </a:solidFill>
+            </a:ln>
+          </p:spPr>
+          <p:style>
+            <a:lnRef idx="1">
+              <a:schemeClr val="accent1"/>
+            </a:lnRef>
+            <a:fillRef idx="0">
+              <a:schemeClr val="accent1"/>
+            </a:fillRef>
+            <a:effectRef idx="0">
+              <a:schemeClr val="accent1"/>
+            </a:effectRef>
+            <a:fontRef idx="minor">
+              <a:schemeClr val="tx1"/>
+            </a:fontRef>
+          </p:style>
+        </p:cxnSp>
+        <p:sp>
+          <p:nvSpPr>
+            <p:cNvPr id="74" name="CaixaDeTexto 73"/>
+            <p:cNvSpPr txBox="1"/>
+            <p:nvPr/>
+          </p:nvSpPr>
+          <p:spPr>
+            <a:xfrm>
+              <a:off x="2058415" y="5443869"/>
+              <a:ext cx="2258567" cy="276999"/>
+            </a:xfrm>
+            <a:prstGeom prst="rect">
+              <a:avLst/>
+            </a:prstGeom>
+            <a:noFill/>
+          </p:spPr>
+          <p:txBody>
+            <a:bodyPr wrap="none" rtlCol="0">
+              <a:spAutoFit/>
+            </a:bodyPr>
+            <a:lstStyle/>
+            <a:p>
+              <a:r>
+                <a:rPr lang="pt-BR" sz="1200" dirty="0" smtClean="0">
+                  <a:solidFill>
+                    <a:prstClr val="white">
+                      <a:lumMod val="50000"/>
+                    </a:prstClr>
+                  </a:solidFill>
+                </a:rPr>
+                <a:t>Não tem uma conta? </a:t>
+              </a:r>
+              <a:r>
+                <a:rPr lang="pt-BR" sz="1200" dirty="0" smtClean="0">
+                  <a:solidFill>
+                    <a:srgbClr val="C00000"/>
+                  </a:solidFill>
+                </a:rPr>
+                <a:t>Cadastre-se</a:t>
+              </a:r>
+              <a:endParaRPr lang="pt-BR" sz="1200" dirty="0">
+                <a:solidFill>
+                  <a:srgbClr val="C00000"/>
+                </a:solidFill>
+              </a:endParaRPr>
+            </a:p>
+          </p:txBody>
+        </p:sp>
+        <p:sp>
+          <p:nvSpPr>
+            <p:cNvPr id="75" name="Fluxograma: Conector 74"/>
+            <p:cNvSpPr/>
+            <p:nvPr/>
+          </p:nvSpPr>
+          <p:spPr>
+            <a:xfrm>
+              <a:off x="3136900" y="312821"/>
+              <a:ext cx="77588" cy="45719"/>
+            </a:xfrm>
+            <a:prstGeom prst="flowChartConnector">
+              <a:avLst/>
+            </a:prstGeom>
+            <a:solidFill>
+              <a:schemeClr val="bg1"/>
+            </a:solidFill>
+            <a:ln>
+              <a:solidFill>
+                <a:schemeClr val="bg1"/>
+              </a:solidFill>
+            </a:ln>
+          </p:spPr>
+          <p:style>
+            <a:lnRef idx="2">
+              <a:schemeClr val="accent1">
+                <a:shade val="50000"/>
+              </a:schemeClr>
+            </a:lnRef>
+            <a:fillRef idx="1">
+              <a:schemeClr val="accent1"/>
+            </a:fillRef>
+            <a:effectRef idx="0">
+              <a:schemeClr val="accent1"/>
+            </a:effectRef>
+            <a:fontRef idx="minor">
+              <a:schemeClr val="lt1"/>
+            </a:fontRef>
+          </p:style>
+          <p:txBody>
+            <a:bodyPr rtlCol="0" anchor="ctr"/>
+            <a:lstStyle/>
+            <a:p>
+              <a:pPr algn="ctr"/>
+              <a:endParaRPr lang="pt-BR">
+                <a:solidFill>
+                  <a:prstClr val="white"/>
+                </a:solidFill>
+              </a:endParaRPr>
+            </a:p>
+          </p:txBody>
+        </p:sp>
+        <p:grpSp>
+          <p:nvGrpSpPr>
+            <p:cNvPr id="76" name="Agrupar 48"/>
+            <p:cNvGrpSpPr/>
+            <p:nvPr/>
+          </p:nvGrpSpPr>
+          <p:grpSpPr>
+            <a:xfrm>
+              <a:off x="1640967" y="510733"/>
+              <a:ext cx="3066049" cy="371509"/>
+              <a:chOff x="5533856" y="648075"/>
+              <a:chExt cx="3066049" cy="371509"/>
+            </a:xfrm>
+          </p:grpSpPr>
+          <p:sp>
+            <p:nvSpPr>
+              <p:cNvPr id="78" name="Retângulo 77"/>
+              <p:cNvSpPr/>
+              <p:nvPr/>
+            </p:nvSpPr>
+            <p:spPr>
+              <a:xfrm>
+                <a:off x="5590005" y="832741"/>
+                <a:ext cx="3009900" cy="140894"/>
+              </a:xfrm>
+              <a:prstGeom prst="rect">
+                <a:avLst/>
+              </a:prstGeom>
+              <a:solidFill>
+                <a:schemeClr val="tx1"/>
+              </a:solidFill>
+              <a:ln>
+                <a:solidFill>
+                  <a:schemeClr val="tx1"/>
+                </a:solidFill>
+              </a:ln>
+            </p:spPr>
+            <p:style>
+              <a:lnRef idx="2">
+                <a:schemeClr val="accent1">
+                  <a:shade val="50000"/>
+                </a:schemeClr>
+              </a:lnRef>
+              <a:fillRef idx="1">
+                <a:schemeClr val="accent1"/>
+              </a:fillRef>
+              <a:effectRef idx="0">
+                <a:schemeClr val="accent1"/>
+              </a:effectRef>
+              <a:fontRef idx="minor">
+                <a:schemeClr val="lt1"/>
+              </a:fontRef>
+            </p:style>
+            <p:txBody>
+              <a:bodyPr rtlCol="0" anchor="ctr"/>
+              <a:lstStyle/>
+              <a:p>
+                <a:pPr algn="ctr"/>
+                <a:endParaRPr lang="pt-BR">
+                  <a:solidFill>
+                    <a:prstClr val="white"/>
+                  </a:solidFill>
+                </a:endParaRPr>
+              </a:p>
+            </p:txBody>
+          </p:sp>
+          <p:sp>
+            <p:nvSpPr>
+              <p:cNvPr id="79" name="CaixaDeTexto 78"/>
+              <p:cNvSpPr txBox="1"/>
+              <p:nvPr/>
+            </p:nvSpPr>
+            <p:spPr>
+              <a:xfrm>
+                <a:off x="5533856" y="648075"/>
+                <a:ext cx="473206" cy="369332"/>
+              </a:xfrm>
+              <a:prstGeom prst="rect">
+                <a:avLst/>
+              </a:prstGeom>
+              <a:noFill/>
+              <a:ln>
+                <a:solidFill>
+                  <a:schemeClr val="tx1"/>
+                </a:solidFill>
+              </a:ln>
+              <a:effectLst>
+                <a:softEdge rad="0"/>
+              </a:effectLst>
+            </p:spPr>
+            <p:txBody>
+              <a:bodyPr wrap="square" rtlCol="0">
+                <a:spAutoFit/>
+              </a:bodyPr>
+              <a:lstStyle/>
+              <a:p>
+                <a:r>
+                  <a:rPr lang="pt-BR" dirty="0" smtClean="0">
+                    <a:solidFill>
+                      <a:prstClr val="white"/>
+                    </a:solidFill>
+                  </a:rPr>
+                  <a:t>.....</a:t>
+                </a:r>
+                <a:endParaRPr lang="pt-BR" dirty="0">
+                  <a:solidFill>
+                    <a:prstClr val="white"/>
+                  </a:solidFill>
+                </a:endParaRPr>
+              </a:p>
+            </p:txBody>
+          </p:sp>
+          <p:sp>
+            <p:nvSpPr>
+              <p:cNvPr id="80" name="CaixaDeTexto 79"/>
+              <p:cNvSpPr txBox="1"/>
+              <p:nvPr/>
+            </p:nvSpPr>
+            <p:spPr>
+              <a:xfrm>
+                <a:off x="6836904" y="788752"/>
+                <a:ext cx="445956" cy="230832"/>
+              </a:xfrm>
+              <a:prstGeom prst="rect">
+                <a:avLst/>
+              </a:prstGeom>
+              <a:noFill/>
+              <a:ln>
+                <a:solidFill>
+                  <a:schemeClr val="tx1"/>
+                </a:solidFill>
+              </a:ln>
+            </p:spPr>
+            <p:txBody>
+              <a:bodyPr wrap="none" rtlCol="0">
+                <a:spAutoFit/>
+              </a:bodyPr>
+              <a:lstStyle/>
+              <a:p>
+                <a:r>
+                  <a:rPr lang="pt-BR" sz="900" dirty="0" smtClean="0">
+                    <a:solidFill>
+                      <a:prstClr val="white"/>
+                    </a:solidFill>
+                  </a:rPr>
+                  <a:t>15:00</a:t>
+                </a:r>
+                <a:endParaRPr lang="pt-BR" sz="900" dirty="0">
+                  <a:solidFill>
+                    <a:prstClr val="white"/>
+                  </a:solidFill>
+                </a:endParaRPr>
+              </a:p>
+            </p:txBody>
+          </p:sp>
+          <p:sp>
+            <p:nvSpPr>
+              <p:cNvPr id="81" name="Retângulo 80"/>
+              <p:cNvSpPr/>
+              <p:nvPr/>
+            </p:nvSpPr>
+            <p:spPr>
+              <a:xfrm>
+                <a:off x="8386010" y="867092"/>
+                <a:ext cx="156411" cy="57893"/>
+              </a:xfrm>
+              <a:prstGeom prst="rect">
+                <a:avLst/>
+              </a:prstGeom>
+              <a:solidFill>
+                <a:schemeClr val="bg1"/>
+              </a:solidFill>
+              <a:ln>
+                <a:solidFill>
+                  <a:schemeClr val="tx1"/>
+                </a:solidFill>
+              </a:ln>
+            </p:spPr>
+            <p:style>
+              <a:lnRef idx="2">
+                <a:schemeClr val="accent1">
+                  <a:shade val="50000"/>
+                </a:schemeClr>
+              </a:lnRef>
+              <a:fillRef idx="1">
+                <a:schemeClr val="accent1"/>
+              </a:fillRef>
+              <a:effectRef idx="0">
+                <a:schemeClr val="accent1"/>
+              </a:effectRef>
+              <a:fontRef idx="minor">
+                <a:schemeClr val="lt1"/>
+              </a:fontRef>
+            </p:style>
+            <p:txBody>
+              <a:bodyPr rtlCol="0" anchor="ctr"/>
+              <a:lstStyle/>
+              <a:p>
+                <a:pPr algn="ctr"/>
+                <a:endParaRPr lang="pt-BR">
+                  <a:solidFill>
+                    <a:prstClr val="white"/>
+                  </a:solidFill>
+                </a:endParaRPr>
+              </a:p>
+            </p:txBody>
+          </p:sp>
+          <p:pic>
+            <p:nvPicPr>
+              <p:cNvPr id="82" name="Imagem 81"/>
+              <p:cNvPicPr>
+                <a:picLocks noChangeAspect="1"/>
+              </p:cNvPicPr>
+              <p:nvPr/>
+            </p:nvPicPr>
+            <p:blipFill rotWithShape="1">
+              <a:blip r:embed="rId3" cstate="print">
+                <a:extLst>
+                  <a:ext uri="{28A0092B-C50C-407E-A947-70E740481C1C}">
+                    <a14:useLocalDpi xmlns:a14="http://schemas.microsoft.com/office/drawing/2010/main" val="0"/>
+                  </a:ext>
+                </a:extLst>
+              </a:blip>
+              <a:srcRect l="18387" t="22636" r="18353" b="28062"/>
+              <a:stretch/>
+            </p:blipFill>
+            <p:spPr>
+              <a:xfrm flipH="1">
+                <a:off x="5950913" y="847464"/>
+                <a:ext cx="136967" cy="114140"/>
+              </a:xfrm>
+              <a:prstGeom prst="rect">
+                <a:avLst/>
+              </a:prstGeom>
+              <a:ln>
+                <a:solidFill>
+                  <a:schemeClr val="tx1"/>
+                </a:solidFill>
+              </a:ln>
+            </p:spPr>
+          </p:pic>
+        </p:grpSp>
+        <p:pic>
+          <p:nvPicPr>
+            <p:cNvPr id="77" name="Imagem 76"/>
+            <p:cNvPicPr>
+              <a:picLocks noChangeAspect="1"/>
+            </p:cNvPicPr>
+            <p:nvPr/>
+          </p:nvPicPr>
+          <p:blipFill>
+            <a:blip r:embed="rId4" cstate="print">
+              <a:extLst>
+                <a:ext uri="{28A0092B-C50C-407E-A947-70E740481C1C}">
+                  <a14:useLocalDpi xmlns:a14="http://schemas.microsoft.com/office/drawing/2010/main" val="0"/>
+                </a:ext>
+              </a:extLst>
+            </a:blip>
+            <a:stretch>
+              <a:fillRect/>
+            </a:stretch>
+          </p:blipFill>
+          <p:spPr>
+            <a:xfrm>
+              <a:off x="1716774" y="869375"/>
+              <a:ext cx="2965911" cy="1496690"/>
+            </a:xfrm>
+            <a:prstGeom prst="rect">
+              <a:avLst/>
+            </a:prstGeom>
+          </p:spPr>
+        </p:pic>
+      </p:grpSp>
+      <p:grpSp>
+        <p:nvGrpSpPr>
+          <p:cNvPr id="107" name="Grupo 106"/>
+          <p:cNvGrpSpPr/>
+          <p:nvPr/>
+        </p:nvGrpSpPr>
+        <p:grpSpPr>
+          <a:xfrm>
+            <a:off x="7168897" y="769441"/>
+            <a:ext cx="3581975" cy="6056366"/>
+            <a:chOff x="6337300" y="173274"/>
+            <a:chExt cx="3860800" cy="6527800"/>
+          </a:xfrm>
+        </p:grpSpPr>
+        <p:grpSp>
+          <p:nvGrpSpPr>
+            <p:cNvPr id="83" name="Agrupar 68"/>
+            <p:cNvGrpSpPr/>
+            <p:nvPr/>
+          </p:nvGrpSpPr>
+          <p:grpSpPr>
+            <a:xfrm>
+              <a:off x="6337300" y="173274"/>
+              <a:ext cx="3860800" cy="6527800"/>
+              <a:chOff x="6316711" y="225260"/>
+              <a:chExt cx="3860800" cy="6527800"/>
+            </a:xfrm>
+          </p:grpSpPr>
+          <p:sp>
+            <p:nvSpPr>
+              <p:cNvPr id="84" name="CaixaDeTexto 83"/>
+              <p:cNvSpPr txBox="1"/>
+              <p:nvPr/>
+            </p:nvSpPr>
+            <p:spPr>
+              <a:xfrm>
+                <a:off x="9071811" y="1167063"/>
+                <a:ext cx="184731" cy="369332"/>
+              </a:xfrm>
+              <a:prstGeom prst="rect">
+                <a:avLst/>
+              </a:prstGeom>
+              <a:noFill/>
+            </p:spPr>
+            <p:txBody>
+              <a:bodyPr wrap="none" rtlCol="0">
+                <a:spAutoFit/>
+              </a:bodyPr>
+              <a:lstStyle/>
+              <a:p>
+                <a:endParaRPr lang="pt-BR" dirty="0">
+                  <a:solidFill>
+                    <a:prstClr val="black"/>
+                  </a:solidFill>
+                </a:endParaRPr>
+              </a:p>
+            </p:txBody>
+          </p:sp>
+          <p:sp>
+            <p:nvSpPr>
+              <p:cNvPr id="85" name="Retângulo Arredondado 42"/>
+              <p:cNvSpPr/>
+              <p:nvPr/>
+            </p:nvSpPr>
+            <p:spPr>
+              <a:xfrm>
+                <a:off x="6316711" y="225260"/>
+                <a:ext cx="3860800" cy="6527800"/>
+              </a:xfrm>
+              <a:prstGeom prst="roundRect">
+                <a:avLst/>
+              </a:prstGeom>
+              <a:solidFill>
+                <a:schemeClr val="tx1"/>
+              </a:solidFill>
+            </p:spPr>
+            <p:style>
+              <a:lnRef idx="2">
+                <a:schemeClr val="accent1">
+                  <a:shade val="50000"/>
+                </a:schemeClr>
+              </a:lnRef>
+              <a:fillRef idx="1">
+                <a:schemeClr val="accent1"/>
+              </a:fillRef>
+              <a:effectRef idx="0">
+                <a:schemeClr val="accent1"/>
+              </a:effectRef>
+              <a:fontRef idx="minor">
+                <a:schemeClr val="lt1"/>
+              </a:fontRef>
+            </p:style>
+            <p:txBody>
+              <a:bodyPr rtlCol="0" anchor="ctr"/>
+              <a:lstStyle/>
+              <a:p>
+                <a:pPr algn="ctr"/>
+                <a:endParaRPr lang="pt-BR">
+                  <a:solidFill>
+                    <a:prstClr val="white"/>
+                  </a:solidFill>
+                </a:endParaRPr>
+              </a:p>
+            </p:txBody>
+          </p:sp>
+          <p:sp>
+            <p:nvSpPr>
+              <p:cNvPr id="86" name="Retângulo 85"/>
+              <p:cNvSpPr/>
+              <p:nvPr/>
+            </p:nvSpPr>
+            <p:spPr>
+              <a:xfrm>
+                <a:off x="6786478" y="698500"/>
+                <a:ext cx="3009900" cy="5461000"/>
+              </a:xfrm>
+              <a:prstGeom prst="rect">
+                <a:avLst/>
+              </a:prstGeom>
+              <a:solidFill>
+                <a:schemeClr val="bg1"/>
+              </a:solidFill>
+            </p:spPr>
+            <p:style>
+              <a:lnRef idx="2">
+                <a:schemeClr val="accent1">
+                  <a:shade val="50000"/>
+                </a:schemeClr>
+              </a:lnRef>
+              <a:fillRef idx="1">
+                <a:schemeClr val="accent1"/>
+              </a:fillRef>
+              <a:effectRef idx="0">
+                <a:schemeClr val="accent1"/>
+              </a:effectRef>
+              <a:fontRef idx="minor">
+                <a:schemeClr val="lt1"/>
+              </a:fontRef>
+            </p:style>
+            <p:txBody>
+              <a:bodyPr rtlCol="0" anchor="ctr"/>
+              <a:lstStyle/>
+              <a:p>
+                <a:pPr algn="ctr"/>
+                <a:endParaRPr lang="pt-BR" dirty="0">
+                  <a:solidFill>
+                    <a:prstClr val="white"/>
+                  </a:solidFill>
+                </a:endParaRPr>
+              </a:p>
+            </p:txBody>
+          </p:sp>
+          <p:sp>
+            <p:nvSpPr>
+              <p:cNvPr id="87" name="Elipse 86"/>
+              <p:cNvSpPr/>
+              <p:nvPr/>
+            </p:nvSpPr>
+            <p:spPr>
+              <a:xfrm>
+                <a:off x="8075528" y="6248400"/>
+                <a:ext cx="431800" cy="406400"/>
+              </a:xfrm>
+              <a:prstGeom prst="ellipse">
+                <a:avLst/>
+              </a:prstGeom>
+              <a:solidFill>
+                <a:schemeClr val="bg1"/>
+              </a:solidFill>
+            </p:spPr>
+            <p:style>
+              <a:lnRef idx="2">
+                <a:schemeClr val="accent1">
+                  <a:shade val="50000"/>
+                </a:schemeClr>
+              </a:lnRef>
+              <a:fillRef idx="1">
+                <a:schemeClr val="accent1"/>
+              </a:fillRef>
+              <a:effectRef idx="0">
+                <a:schemeClr val="accent1"/>
+              </a:effectRef>
+              <a:fontRef idx="minor">
+                <a:schemeClr val="lt1"/>
+              </a:fontRef>
+            </p:style>
+            <p:txBody>
+              <a:bodyPr rtlCol="0" anchor="ctr"/>
+              <a:lstStyle/>
+              <a:p>
+                <a:pPr algn="ctr"/>
+                <a:endParaRPr lang="pt-BR">
+                  <a:solidFill>
+                    <a:prstClr val="white"/>
+                  </a:solidFill>
+                </a:endParaRPr>
+              </a:p>
+            </p:txBody>
+          </p:sp>
+          <p:sp>
+            <p:nvSpPr>
+              <p:cNvPr id="88" name="Fluxograma: Conector 87"/>
+              <p:cNvSpPr/>
+              <p:nvPr/>
+            </p:nvSpPr>
+            <p:spPr>
+              <a:xfrm>
+                <a:off x="8247111" y="358540"/>
+                <a:ext cx="77588" cy="45719"/>
+              </a:xfrm>
+              <a:prstGeom prst="flowChartConnector">
+                <a:avLst/>
+              </a:prstGeom>
+              <a:solidFill>
+                <a:schemeClr val="bg1"/>
+              </a:solidFill>
+              <a:ln>
+                <a:solidFill>
+                  <a:schemeClr val="bg1"/>
+                </a:solidFill>
+              </a:ln>
+            </p:spPr>
+            <p:style>
+              <a:lnRef idx="2">
+                <a:schemeClr val="accent1">
+                  <a:shade val="50000"/>
+                </a:schemeClr>
+              </a:lnRef>
+              <a:fillRef idx="1">
+                <a:schemeClr val="accent1"/>
+              </a:fillRef>
+              <a:effectRef idx="0">
+                <a:schemeClr val="accent1"/>
+              </a:effectRef>
+              <a:fontRef idx="minor">
+                <a:schemeClr val="lt1"/>
+              </a:fontRef>
+            </p:style>
+            <p:txBody>
+              <a:bodyPr rtlCol="0" anchor="ctr"/>
+              <a:lstStyle/>
+              <a:p>
+                <a:pPr algn="ctr"/>
+                <a:endParaRPr lang="pt-BR">
+                  <a:solidFill>
+                    <a:prstClr val="white"/>
+                  </a:solidFill>
+                </a:endParaRPr>
+              </a:p>
+            </p:txBody>
+          </p:sp>
+          <p:cxnSp>
+            <p:nvCxnSpPr>
+              <p:cNvPr id="89" name="Conector reto 88"/>
+              <p:cNvCxnSpPr/>
+              <p:nvPr/>
+            </p:nvCxnSpPr>
+            <p:spPr>
+              <a:xfrm>
+                <a:off x="7885855" y="505391"/>
+                <a:ext cx="800100" cy="0"/>
+              </a:xfrm>
+              <a:prstGeom prst="line">
+                <a:avLst/>
+              </a:prstGeom>
+              <a:ln>
+                <a:solidFill>
+                  <a:schemeClr val="bg1"/>
+                </a:solidFill>
+              </a:ln>
+            </p:spPr>
+            <p:style>
+              <a:lnRef idx="1">
+                <a:schemeClr val="accent1"/>
+              </a:lnRef>
+              <a:fillRef idx="0">
+                <a:schemeClr val="accent1"/>
+              </a:fillRef>
+              <a:effectRef idx="0">
+                <a:schemeClr val="accent1"/>
+              </a:effectRef>
+              <a:fontRef idx="minor">
+                <a:schemeClr val="tx1"/>
+              </a:fontRef>
+            </p:style>
+          </p:cxnSp>
+          <p:sp>
+            <p:nvSpPr>
+              <p:cNvPr id="90" name="Fluxograma: Conector 89"/>
+              <p:cNvSpPr/>
+              <p:nvPr/>
+            </p:nvSpPr>
+            <p:spPr>
+              <a:xfrm flipV="1">
+                <a:off x="7577877" y="393700"/>
+                <a:ext cx="127000" cy="88900"/>
+              </a:xfrm>
+              <a:prstGeom prst="flowChartConnector">
+                <a:avLst/>
+              </a:prstGeom>
+              <a:solidFill>
+                <a:schemeClr val="bg1"/>
+              </a:solidFill>
+              <a:ln>
+                <a:solidFill>
+                  <a:schemeClr val="bg1"/>
+                </a:solidFill>
+              </a:ln>
+            </p:spPr>
+            <p:style>
+              <a:lnRef idx="2">
+                <a:schemeClr val="accent1">
+                  <a:shade val="50000"/>
+                </a:schemeClr>
+              </a:lnRef>
+              <a:fillRef idx="1">
+                <a:schemeClr val="accent1"/>
+              </a:fillRef>
+              <a:effectRef idx="0">
+                <a:schemeClr val="accent1"/>
+              </a:effectRef>
+              <a:fontRef idx="minor">
+                <a:schemeClr val="lt1"/>
+              </a:fontRef>
+            </p:style>
+            <p:txBody>
+              <a:bodyPr rtlCol="0" anchor="ctr"/>
+              <a:lstStyle/>
+              <a:p>
+                <a:pPr algn="ctr"/>
+                <a:endParaRPr lang="pt-BR">
+                  <a:solidFill>
+                    <a:prstClr val="white"/>
+                  </a:solidFill>
+                </a:endParaRPr>
+              </a:p>
+            </p:txBody>
+          </p:sp>
+          <p:grpSp>
+            <p:nvGrpSpPr>
+              <p:cNvPr id="91" name="Agrupar 41"/>
+              <p:cNvGrpSpPr/>
+              <p:nvPr/>
+            </p:nvGrpSpPr>
+            <p:grpSpPr>
+              <a:xfrm>
+                <a:off x="6728183" y="509858"/>
+                <a:ext cx="3066049" cy="371509"/>
+                <a:chOff x="5533856" y="648075"/>
+                <a:chExt cx="3066049" cy="371509"/>
+              </a:xfrm>
+            </p:grpSpPr>
+            <p:sp>
+              <p:nvSpPr>
+                <p:cNvPr id="100" name="Retângulo 99"/>
+                <p:cNvSpPr/>
+                <p:nvPr/>
+              </p:nvSpPr>
+              <p:spPr>
+                <a:xfrm>
+                  <a:off x="5590005" y="832741"/>
+                  <a:ext cx="3009900" cy="140894"/>
+                </a:xfrm>
+                <a:prstGeom prst="rect">
+                  <a:avLst/>
+                </a:prstGeom>
+                <a:solidFill>
+                  <a:schemeClr val="tx1"/>
+                </a:solidFill>
+                <a:ln>
+                  <a:solidFill>
+                    <a:schemeClr val="tx1"/>
+                  </a:solidFill>
+                </a:ln>
+              </p:spPr>
+              <p:style>
+                <a:lnRef idx="2">
+                  <a:schemeClr val="accent1">
+                    <a:shade val="50000"/>
+                  </a:schemeClr>
+                </a:lnRef>
+                <a:fillRef idx="1">
+                  <a:schemeClr val="accent1"/>
+                </a:fillRef>
+                <a:effectRef idx="0">
+                  <a:schemeClr val="accent1"/>
+                </a:effectRef>
+                <a:fontRef idx="minor">
+                  <a:schemeClr val="lt1"/>
+                </a:fontRef>
+              </p:style>
+              <p:txBody>
+                <a:bodyPr rtlCol="0" anchor="ctr"/>
+                <a:lstStyle/>
+                <a:p>
+                  <a:pPr algn="ctr"/>
+                  <a:endParaRPr lang="pt-BR">
+                    <a:solidFill>
+                      <a:prstClr val="white"/>
+                    </a:solidFill>
+                  </a:endParaRPr>
+                </a:p>
+              </p:txBody>
+            </p:sp>
+            <p:sp>
+              <p:nvSpPr>
+                <p:cNvPr id="101" name="CaixaDeTexto 100"/>
+                <p:cNvSpPr txBox="1"/>
+                <p:nvPr/>
+              </p:nvSpPr>
+              <p:spPr>
+                <a:xfrm>
+                  <a:off x="5533856" y="648075"/>
+                  <a:ext cx="473206" cy="369332"/>
+                </a:xfrm>
+                <a:prstGeom prst="rect">
+                  <a:avLst/>
+                </a:prstGeom>
+                <a:noFill/>
+                <a:ln>
+                  <a:solidFill>
+                    <a:schemeClr val="tx1"/>
+                  </a:solidFill>
+                </a:ln>
+                <a:effectLst>
+                  <a:softEdge rad="0"/>
+                </a:effectLst>
+              </p:spPr>
+              <p:txBody>
+                <a:bodyPr wrap="square" rtlCol="0">
+                  <a:spAutoFit/>
+                </a:bodyPr>
+                <a:lstStyle/>
+                <a:p>
+                  <a:r>
+                    <a:rPr lang="pt-BR" dirty="0" smtClean="0">
+                      <a:solidFill>
+                        <a:prstClr val="white"/>
+                      </a:solidFill>
+                    </a:rPr>
+                    <a:t>.....</a:t>
+                  </a:r>
+                  <a:endParaRPr lang="pt-BR" dirty="0">
+                    <a:solidFill>
+                      <a:prstClr val="white"/>
+                    </a:solidFill>
+                  </a:endParaRPr>
+                </a:p>
+              </p:txBody>
+            </p:sp>
+            <p:sp>
+              <p:nvSpPr>
+                <p:cNvPr id="102" name="CaixaDeTexto 101"/>
+                <p:cNvSpPr txBox="1"/>
+                <p:nvPr/>
+              </p:nvSpPr>
+              <p:spPr>
+                <a:xfrm>
+                  <a:off x="6836904" y="788752"/>
+                  <a:ext cx="445956" cy="230832"/>
+                </a:xfrm>
+                <a:prstGeom prst="rect">
+                  <a:avLst/>
+                </a:prstGeom>
+                <a:noFill/>
+                <a:ln>
+                  <a:solidFill>
+                    <a:schemeClr val="tx1"/>
+                  </a:solidFill>
+                </a:ln>
+              </p:spPr>
+              <p:txBody>
+                <a:bodyPr wrap="none" rtlCol="0">
+                  <a:spAutoFit/>
+                </a:bodyPr>
+                <a:lstStyle/>
+                <a:p>
+                  <a:r>
+                    <a:rPr lang="pt-BR" sz="900" dirty="0" smtClean="0">
+                      <a:solidFill>
+                        <a:prstClr val="white"/>
+                      </a:solidFill>
+                    </a:rPr>
+                    <a:t>15:00</a:t>
+                  </a:r>
+                  <a:endParaRPr lang="pt-BR" sz="900" dirty="0">
+                    <a:solidFill>
+                      <a:prstClr val="white"/>
+                    </a:solidFill>
+                  </a:endParaRPr>
+                </a:p>
+              </p:txBody>
+            </p:sp>
+            <p:sp>
+              <p:nvSpPr>
+                <p:cNvPr id="103" name="Retângulo 102"/>
+                <p:cNvSpPr/>
+                <p:nvPr/>
+              </p:nvSpPr>
+              <p:spPr>
+                <a:xfrm>
+                  <a:off x="8386010" y="867092"/>
+                  <a:ext cx="156411" cy="57893"/>
+                </a:xfrm>
+                <a:prstGeom prst="rect">
+                  <a:avLst/>
+                </a:prstGeom>
+                <a:solidFill>
+                  <a:schemeClr val="bg1"/>
+                </a:solidFill>
+                <a:ln>
+                  <a:solidFill>
+                    <a:schemeClr val="tx1"/>
+                  </a:solidFill>
+                </a:ln>
+              </p:spPr>
+              <p:style>
+                <a:lnRef idx="2">
+                  <a:schemeClr val="accent1">
+                    <a:shade val="50000"/>
+                  </a:schemeClr>
+                </a:lnRef>
+                <a:fillRef idx="1">
+                  <a:schemeClr val="accent1"/>
+                </a:fillRef>
+                <a:effectRef idx="0">
+                  <a:schemeClr val="accent1"/>
+                </a:effectRef>
+                <a:fontRef idx="minor">
+                  <a:schemeClr val="lt1"/>
+                </a:fontRef>
+              </p:style>
+              <p:txBody>
+                <a:bodyPr rtlCol="0" anchor="ctr"/>
+                <a:lstStyle/>
+                <a:p>
+                  <a:pPr algn="ctr"/>
+                  <a:endParaRPr lang="pt-BR">
+                    <a:solidFill>
+                      <a:prstClr val="white"/>
+                    </a:solidFill>
+                  </a:endParaRPr>
+                </a:p>
+              </p:txBody>
+            </p:sp>
+            <p:pic>
+              <p:nvPicPr>
+                <p:cNvPr id="104" name="Imagem 103"/>
+                <p:cNvPicPr>
+                  <a:picLocks noChangeAspect="1"/>
+                </p:cNvPicPr>
+                <p:nvPr/>
+              </p:nvPicPr>
+              <p:blipFill rotWithShape="1">
+                <a:blip r:embed="rId3" cstate="print">
+                  <a:extLst>
+                    <a:ext uri="{28A0092B-C50C-407E-A947-70E740481C1C}">
+                      <a14:useLocalDpi xmlns:a14="http://schemas.microsoft.com/office/drawing/2010/main" val="0"/>
+                    </a:ext>
+                  </a:extLst>
+                </a:blip>
+                <a:srcRect l="18387" t="22636" r="18353" b="28062"/>
+                <a:stretch/>
+              </p:blipFill>
+              <p:spPr>
+                <a:xfrm flipH="1">
+                  <a:off x="5950913" y="847464"/>
+                  <a:ext cx="136967" cy="114140"/>
+                </a:xfrm>
+                <a:prstGeom prst="rect">
+                  <a:avLst/>
+                </a:prstGeom>
+                <a:ln>
+                  <a:solidFill>
+                    <a:schemeClr val="tx1"/>
+                  </a:solidFill>
+                </a:ln>
+              </p:spPr>
+            </p:pic>
+          </p:grpSp>
+          <p:pic>
+            <p:nvPicPr>
+              <p:cNvPr id="92" name="Imagem 91"/>
+              <p:cNvPicPr>
+                <a:picLocks noChangeAspect="1"/>
+              </p:cNvPicPr>
+              <p:nvPr/>
+            </p:nvPicPr>
+            <p:blipFill>
+              <a:blip r:embed="rId5" cstate="print">
+                <a:extLst>
+                  <a:ext uri="{28A0092B-C50C-407E-A947-70E740481C1C}">
+                    <a14:useLocalDpi xmlns:a14="http://schemas.microsoft.com/office/drawing/2010/main" val="0"/>
+                  </a:ext>
+                </a:extLst>
+              </a:blip>
+              <a:stretch>
+                <a:fillRect/>
+              </a:stretch>
+            </p:blipFill>
+            <p:spPr>
+              <a:xfrm>
+                <a:off x="6904383" y="858198"/>
+                <a:ext cx="2675954" cy="1162367"/>
+              </a:xfrm>
+              <a:prstGeom prst="rect">
+                <a:avLst/>
+              </a:prstGeom>
+            </p:spPr>
+          </p:pic>
+          <p:pic>
+            <p:nvPicPr>
+              <p:cNvPr id="93" name="Imagem 92"/>
+              <p:cNvPicPr>
+                <a:picLocks noChangeAspect="1"/>
+              </p:cNvPicPr>
+              <p:nvPr/>
+            </p:nvPicPr>
+            <p:blipFill rotWithShape="1">
+              <a:blip r:embed="rId6" cstate="print">
+                <a:extLst>
+                  <a:ext uri="{28A0092B-C50C-407E-A947-70E740481C1C}">
+                    <a14:useLocalDpi xmlns:a14="http://schemas.microsoft.com/office/drawing/2010/main" val="0"/>
+                  </a:ext>
+                </a:extLst>
+              </a:blip>
+              <a:srcRect l="49095" t="2879" r="9951"/>
+              <a:stretch/>
+            </p:blipFill>
+            <p:spPr>
+              <a:xfrm>
+                <a:off x="7006118" y="4499937"/>
+                <a:ext cx="565731" cy="1341624"/>
+              </a:xfrm>
+              <a:prstGeom prst="rect">
+                <a:avLst/>
+              </a:prstGeom>
+            </p:spPr>
+          </p:pic>
+          <p:pic>
+            <p:nvPicPr>
+              <p:cNvPr id="94" name="Imagem 93"/>
+              <p:cNvPicPr>
+                <a:picLocks noChangeAspect="1"/>
+              </p:cNvPicPr>
+              <p:nvPr/>
+            </p:nvPicPr>
+            <p:blipFill rotWithShape="1">
+              <a:blip r:embed="rId6" cstate="print">
+                <a:extLst>
+                  <a:ext uri="{28A0092B-C50C-407E-A947-70E740481C1C}">
+                    <a14:useLocalDpi xmlns:a14="http://schemas.microsoft.com/office/drawing/2010/main" val="0"/>
+                  </a:ext>
+                </a:extLst>
+              </a:blip>
+              <a:srcRect l="11595" t="1891" r="52878"/>
+              <a:stretch/>
+            </p:blipFill>
+            <p:spPr>
+              <a:xfrm>
+                <a:off x="7054207" y="2909711"/>
+                <a:ext cx="469552" cy="1296702"/>
+              </a:xfrm>
+              <a:prstGeom prst="rect">
+                <a:avLst/>
+              </a:prstGeom>
+            </p:spPr>
+          </p:pic>
+          <p:sp>
+            <p:nvSpPr>
+              <p:cNvPr id="95" name="CaixaDeTexto 94"/>
+              <p:cNvSpPr txBox="1"/>
+              <p:nvPr/>
+            </p:nvSpPr>
+            <p:spPr>
+              <a:xfrm>
+                <a:off x="7941051" y="3147342"/>
+                <a:ext cx="1132554" cy="307777"/>
+              </a:xfrm>
+              <a:prstGeom prst="rect">
+                <a:avLst/>
+              </a:prstGeom>
+              <a:noFill/>
+            </p:spPr>
+            <p:txBody>
+              <a:bodyPr wrap="none" rtlCol="0">
+                <a:spAutoFit/>
+              </a:bodyPr>
+              <a:lstStyle/>
+              <a:p>
+                <a:r>
+                  <a:rPr lang="pt-BR" sz="1400" b="1" dirty="0" smtClean="0">
+                    <a:solidFill>
+                      <a:srgbClr val="FF0000"/>
+                    </a:solidFill>
+                  </a:rPr>
+                  <a:t>Temperatura</a:t>
+                </a:r>
+                <a:endParaRPr lang="pt-BR" sz="1400" b="1" dirty="0">
+                  <a:solidFill>
+                    <a:srgbClr val="FF0000"/>
+                  </a:solidFill>
+                </a:endParaRPr>
+              </a:p>
+            </p:txBody>
+          </p:sp>
+          <p:sp>
+            <p:nvSpPr>
+              <p:cNvPr id="96" name="CaixaDeTexto 95"/>
+              <p:cNvSpPr txBox="1"/>
+              <p:nvPr/>
+            </p:nvSpPr>
+            <p:spPr>
+              <a:xfrm>
+                <a:off x="8041616" y="4648319"/>
+                <a:ext cx="862737" cy="307777"/>
+              </a:xfrm>
+              <a:prstGeom prst="rect">
+                <a:avLst/>
+              </a:prstGeom>
+              <a:noFill/>
+            </p:spPr>
+            <p:txBody>
+              <a:bodyPr wrap="none" rtlCol="0">
+                <a:spAutoFit/>
+              </a:bodyPr>
+              <a:lstStyle/>
+              <a:p>
+                <a:r>
+                  <a:rPr lang="pt-BR" sz="1400" b="1" dirty="0" smtClean="0">
+                    <a:solidFill>
+                      <a:srgbClr val="5B9BD5">
+                        <a:lumMod val="75000"/>
+                      </a:srgbClr>
+                    </a:solidFill>
+                  </a:rPr>
+                  <a:t>Umidade</a:t>
+                </a:r>
+                <a:endParaRPr lang="pt-BR" sz="1400" b="1" dirty="0">
+                  <a:solidFill>
+                    <a:srgbClr val="5B9BD5">
+                      <a:lumMod val="75000"/>
+                    </a:srgbClr>
+                  </a:solidFill>
+                </a:endParaRPr>
+              </a:p>
+            </p:txBody>
+          </p:sp>
+          <p:sp>
+            <p:nvSpPr>
+              <p:cNvPr id="97" name="CaixaDeTexto 96"/>
+              <p:cNvSpPr txBox="1"/>
+              <p:nvPr/>
+            </p:nvSpPr>
+            <p:spPr>
+              <a:xfrm>
+                <a:off x="8075528" y="3351265"/>
+                <a:ext cx="1029545" cy="707886"/>
+              </a:xfrm>
+              <a:prstGeom prst="rect">
+                <a:avLst/>
+              </a:prstGeom>
+              <a:noFill/>
+            </p:spPr>
+            <p:txBody>
+              <a:bodyPr wrap="square" rtlCol="0">
+                <a:spAutoFit/>
+              </a:bodyPr>
+              <a:lstStyle/>
+              <a:p>
+                <a:r>
+                  <a:rPr lang="pt-BR" sz="4000" dirty="0" smtClean="0">
+                    <a:solidFill>
+                      <a:srgbClr val="FF0000"/>
+                    </a:solidFill>
+                  </a:rPr>
+                  <a:t>16°</a:t>
+                </a:r>
+                <a:endParaRPr lang="pt-BR" sz="4000" dirty="0">
+                  <a:solidFill>
+                    <a:srgbClr val="FF0000"/>
+                  </a:solidFill>
+                </a:endParaRPr>
+              </a:p>
+            </p:txBody>
+          </p:sp>
+          <p:sp>
+            <p:nvSpPr>
+              <p:cNvPr id="98" name="CaixaDeTexto 97"/>
+              <p:cNvSpPr txBox="1"/>
+              <p:nvPr/>
+            </p:nvSpPr>
+            <p:spPr>
+              <a:xfrm>
+                <a:off x="7993481" y="4816806"/>
+                <a:ext cx="1331127" cy="707886"/>
+              </a:xfrm>
+              <a:prstGeom prst="rect">
+                <a:avLst/>
+              </a:prstGeom>
+              <a:noFill/>
+            </p:spPr>
+            <p:txBody>
+              <a:bodyPr wrap="square" rtlCol="0">
+                <a:spAutoFit/>
+              </a:bodyPr>
+              <a:lstStyle/>
+              <a:p>
+                <a:r>
+                  <a:rPr lang="pt-BR" sz="4000" dirty="0" smtClean="0">
+                    <a:solidFill>
+                      <a:srgbClr val="0070C0"/>
+                    </a:solidFill>
+                  </a:rPr>
+                  <a:t>48%</a:t>
+                </a:r>
+                <a:endParaRPr lang="pt-BR" sz="4000" dirty="0">
+                  <a:solidFill>
+                    <a:srgbClr val="0070C0"/>
+                  </a:solidFill>
+                </a:endParaRPr>
+              </a:p>
+            </p:txBody>
+          </p:sp>
+          <p:sp>
+            <p:nvSpPr>
+              <p:cNvPr id="99" name="Retângulo Arredondado 65"/>
+              <p:cNvSpPr/>
+              <p:nvPr/>
+            </p:nvSpPr>
+            <p:spPr>
+              <a:xfrm>
+                <a:off x="6838361" y="2844380"/>
+                <a:ext cx="2895087" cy="1418694"/>
+              </a:xfrm>
+              <a:prstGeom prst="roundRect">
+                <a:avLst/>
+              </a:prstGeom>
+              <a:noFill/>
+              <a:ln>
+                <a:solidFill>
+                  <a:srgbClr val="C00000"/>
+                </a:solidFill>
+              </a:ln>
+            </p:spPr>
+            <p:style>
+              <a:lnRef idx="2">
+                <a:schemeClr val="accent1">
+                  <a:shade val="50000"/>
+                </a:schemeClr>
+              </a:lnRef>
+              <a:fillRef idx="1">
+                <a:schemeClr val="accent1"/>
+              </a:fillRef>
+              <a:effectRef idx="0">
+                <a:schemeClr val="accent1"/>
+              </a:effectRef>
+              <a:fontRef idx="minor">
+                <a:schemeClr val="lt1"/>
+              </a:fontRef>
+            </p:style>
+            <p:txBody>
+              <a:bodyPr rtlCol="0" anchor="ctr"/>
+              <a:lstStyle/>
+              <a:p>
+                <a:pPr algn="ctr"/>
+                <a:endParaRPr lang="pt-BR">
+                  <a:solidFill>
+                    <a:prstClr val="white"/>
+                  </a:solidFill>
+                </a:endParaRPr>
+              </a:p>
+            </p:txBody>
+          </p:sp>
+        </p:grpSp>
+        <p:sp>
+          <p:nvSpPr>
+            <p:cNvPr id="105" name="Retângulo Arredondado 65"/>
+            <p:cNvSpPr/>
+            <p:nvPr/>
+          </p:nvSpPr>
+          <p:spPr>
+            <a:xfrm>
+              <a:off x="6858950" y="4386683"/>
+              <a:ext cx="2895087" cy="1418694"/>
+            </a:xfrm>
+            <a:prstGeom prst="roundRect">
+              <a:avLst/>
+            </a:prstGeom>
+            <a:noFill/>
+            <a:ln>
+              <a:solidFill>
+                <a:srgbClr val="C00000"/>
+              </a:solidFill>
+            </a:ln>
+          </p:spPr>
+          <p:style>
+            <a:lnRef idx="2">
+              <a:schemeClr val="accent1">
+                <a:shade val="50000"/>
+              </a:schemeClr>
+            </a:lnRef>
+            <a:fillRef idx="1">
+              <a:schemeClr val="accent1"/>
+            </a:fillRef>
+            <a:effectRef idx="0">
+              <a:schemeClr val="accent1"/>
+            </a:effectRef>
+            <a:fontRef idx="minor">
+              <a:schemeClr val="lt1"/>
+            </a:fontRef>
+          </p:style>
+          <p:txBody>
+            <a:bodyPr rtlCol="0" anchor="ctr"/>
+            <a:lstStyle/>
+            <a:p>
+              <a:pPr algn="ctr"/>
+              <a:endParaRPr lang="pt-BR">
+                <a:solidFill>
+                  <a:prstClr val="white"/>
+                </a:solidFill>
+              </a:endParaRPr>
+            </a:p>
+          </p:txBody>
+        </p:sp>
+        <p:pic>
+          <p:nvPicPr>
+            <p:cNvPr id="106" name="Imagem 105"/>
+            <p:cNvPicPr>
+              <a:picLocks noChangeAspect="1"/>
+            </p:cNvPicPr>
+            <p:nvPr/>
+          </p:nvPicPr>
+          <p:blipFill>
+            <a:blip r:embed="rId7"/>
+            <a:stretch>
+              <a:fillRect/>
+            </a:stretch>
+          </p:blipFill>
+          <p:spPr>
+            <a:xfrm>
+              <a:off x="7010381" y="1756485"/>
+              <a:ext cx="2528834" cy="1035556"/>
+            </a:xfrm>
+            <a:prstGeom prst="rect">
+              <a:avLst/>
+            </a:prstGeom>
+          </p:spPr>
+        </p:pic>
+      </p:grpSp>
+    </p:spTree>
+    <p:extLst>
+      <p:ext uri="{BB962C8B-B14F-4D97-AF65-F5344CB8AC3E}">
+        <p14:creationId xmlns:p14="http://schemas.microsoft.com/office/powerpoint/2010/main" val="3646343174"/>
+      </p:ext>
+    </p:extLst>
+  </p:cSld>
+  <p:clrMapOvr>
+    <a:masterClrMapping/>
+  </p:clrMapOvr>
+</p:sld>
+</file>
+
 <file path=ppt/slides/slide2.xml><?xml version="1.0" encoding="utf-8"?>
 <p:sld xmlns:a="http://schemas.openxmlformats.org/drawingml/2006/main" xmlns:r="http://schemas.openxmlformats.org/officeDocument/2006/relationships" xmlns:p="http://schemas.openxmlformats.org/presentationml/2006/main">
   <p:cSld>
@@ -3179,11 +5378,7 @@
             </a:r>
             <a:r>
               <a:rPr lang="pt-BR" dirty="0" smtClean="0"/>
-              <a:t> – Maringá – PR). </a:t>
-            </a:r>
-            <a:r>
-              <a:rPr lang="pt-BR" dirty="0" smtClean="0"/>
-              <a:t>Pouco </a:t>
+              <a:t> – Maringá – PR). Pouco </a:t>
             </a:r>
             <a:r>
               <a:rPr lang="pt-BR" dirty="0"/>
@@ -3585,7 +5780,6 @@
               <a:rPr lang="pt-BR" b="1" dirty="0" smtClean="0"/>
               <a:t>anos</a:t>
             </a:r>
-            <a:endParaRPr lang="pt-BR" b="1" dirty="0" smtClean="0"/>
           </a:p>
           <a:p>
             <a:r>
@@ -3652,16 +5846,11 @@
               <a:rPr lang="pt-BR" b="1" dirty="0" smtClean="0"/>
               <a:t> </a:t>
             </a:r>
-            <a:endParaRPr lang="pt-BR" b="1" dirty="0" smtClean="0"/>
           </a:p>
           <a:p>
             <a:r>
               <a:rPr lang="pt-BR" b="1" dirty="0" smtClean="0"/>
-              <a:t>Experiência/Formação</a:t>
-            </a:r>
-            <a:r>
-              <a:rPr lang="pt-BR" b="1" dirty="0" smtClean="0"/>
-              <a:t>: </a:t>
+              <a:t>Experiência/Formação: </a:t>
             </a:r>
             <a:r>
               <a:rPr lang="pt-BR" dirty="0" smtClean="0"/>
@@ -3733,6 +5922,7 @@
             <a:endParaRPr lang="pt-BR" sz="1600" dirty="0" smtClean="0"/>
           </a:p>
           <a:p>
+            <a:pPr algn="just"/>
             <a:r>
               <a:rPr lang="pt-BR" sz="1600" dirty="0"/>
               <a:t>Segundo entrevistas feitas com universitários as condições de preservação de suas pesquisas laboratoriais são arcaicas. Os pesquisadores anotavam as informações de temperatura e umidade em folhas de papel, prejudicando a confirmação de informações fidedignas. Além disso, era uma atividade que consumia tempo e esforço desnecessário, podendo assim prejudicar as amostras que necessitam de um monitoramento constante de temperatura e umidade e a própria pesquisa em si, como perda de informações e dados. </a:t>
@@ -3772,6 +5962,7 @@
             <a:endParaRPr lang="pt-BR" sz="1600" dirty="0" smtClean="0"/>
           </a:p>
           <a:p>
+            <a:pPr algn="just"/>
             <a:r>
               <a:rPr lang="pt-BR" sz="1600" dirty="0" smtClean="0"/>
               <a:t>Pensado </a:t>
@@ -4372,7 +6563,7 @@
         </p:nvSpPr>
         <p:spPr>
           <a:xfrm>
-            <a:off x="1190147" y="3470275"/>
+            <a:off x="1190147" y="3303588"/>
             <a:ext cx="2729658" cy="400110"/>
           </a:xfrm>
           <a:prstGeom prst="rect">
@@ -4768,7 +6959,7 @@
         <p:spPr>
           <a:xfrm>
             <a:off x="3276620" y="349241"/>
-            <a:ext cx="5976386" cy="769441"/>
+            <a:ext cx="5976386" cy="1446550"/>
           </a:xfrm>
           <a:prstGeom prst="rect">
             <a:avLst/>
@@ -4781,6 +6972,7 @@
           </a:bodyPr>
           <a:lstStyle/>
           <a:p>
+            <a:pPr algn="ctr"/>
             <a:r>
               <a:rPr lang="pt-BR" sz="4400" b="1" u="sng" dirty="0" smtClean="0">
                 <a:solidFill>
@@ -4794,7 +6986,7 @@
                   </a:outerShdw>
                 </a:effectLst>
               </a:rPr>
-              <a:t>Diagrama de Arquitetura</a:t>
+              <a:t>Diagrama de Arquitetura LLD</a:t>
             </a:r>
             <a:endParaRPr lang="pt-BR" sz="4400" b="1" u="sng" dirty="0">
               <a:solidFill>
@@ -4825,336 +7017,6 @@
 </file>
 
 <file path=ppt/slides/slide5.xml><?xml version="1.0" encoding="utf-8"?>
-<p:sld xmlns:a="http://schemas.openxmlformats.org/drawingml/2006/main" xmlns:r="http://schemas.openxmlformats.org/officeDocument/2006/relationships" xmlns:p="http://schemas.openxmlformats.org/presentationml/2006/main">
-  <p:cSld>
-    <p:spTree>
-      <p:nvGrpSpPr>
-        <p:cNvPr id="1" name=""/>
-        <p:cNvGrpSpPr/>
-        <p:nvPr/>
-      </p:nvGrpSpPr>
-      <p:grpSpPr>
-        <a:xfrm>
-          <a:off x="0" y="0"/>
-          <a:ext cx="0" cy="0"/>
-          <a:chOff x="0" y="0"/>
-          <a:chExt cx="0" cy="0"/>
-        </a:xfrm>
-      </p:grpSpPr>
-      <p:sp>
-        <p:nvSpPr>
-          <p:cNvPr id="4" name="Retângulo 3"/>
-          <p:cNvSpPr/>
-          <p:nvPr/>
-        </p:nvSpPr>
-        <p:spPr>
-          <a:xfrm>
-            <a:off x="910107" y="774410"/>
-            <a:ext cx="6096000" cy="2862194"/>
-          </a:xfrm>
-          <a:prstGeom prst="rect">
-            <a:avLst/>
-          </a:prstGeom>
-        </p:spPr>
-        <p:txBody>
-          <a:bodyPr>
-            <a:spAutoFit/>
-          </a:bodyPr>
-          <a:lstStyle/>
-          <a:p>
-            <a:pPr algn="just">
-              <a:lnSpc>
-                <a:spcPct val="107000"/>
-              </a:lnSpc>
-              <a:spcAft>
-                <a:spcPts val="800"/>
-              </a:spcAft>
-            </a:pPr>
-            <a:r>
-              <a:rPr lang="pt-BR" dirty="0">
-                <a:ea typeface="Calibri" panose="020F0502020204030204" pitchFamily="34" charset="0"/>
-                <a:cs typeface="Times New Roman" panose="02020603050405020304" pitchFamily="18" charset="0"/>
-              </a:rPr>
-              <a:t>Conectar sensor DHT11 ao </a:t>
-            </a:r>
-            <a:r>
-              <a:rPr lang="pt-BR" dirty="0" err="1">
-                <a:ea typeface="Calibri" panose="020F0502020204030204" pitchFamily="34" charset="0"/>
-                <a:cs typeface="Times New Roman" panose="02020603050405020304" pitchFamily="18" charset="0"/>
-              </a:rPr>
-              <a:t>Arduino</a:t>
-            </a:r>
-            <a:r>
-              <a:rPr lang="pt-BR" dirty="0">
-                <a:ea typeface="Calibri" panose="020F0502020204030204" pitchFamily="34" charset="0"/>
-                <a:cs typeface="Times New Roman" panose="02020603050405020304" pitchFamily="18" charset="0"/>
-              </a:rPr>
-              <a:t> UNO, instalar a biblioteca DHT11 para o </a:t>
-            </a:r>
-            <a:r>
-              <a:rPr lang="pt-BR" dirty="0" err="1">
-                <a:ea typeface="Calibri" panose="020F0502020204030204" pitchFamily="34" charset="0"/>
-                <a:cs typeface="Times New Roman" panose="02020603050405020304" pitchFamily="18" charset="0"/>
-              </a:rPr>
-              <a:t>Arduino</a:t>
-            </a:r>
-            <a:r>
-              <a:rPr lang="pt-BR" dirty="0">
-                <a:ea typeface="Calibri" panose="020F0502020204030204" pitchFamily="34" charset="0"/>
-                <a:cs typeface="Times New Roman" panose="02020603050405020304" pitchFamily="18" charset="0"/>
-              </a:rPr>
-              <a:t>, instalar o modulo </a:t>
-            </a:r>
-            <a:r>
-              <a:rPr lang="pt-BR" i="1" dirty="0" err="1">
-                <a:ea typeface="Calibri" panose="020F0502020204030204" pitchFamily="34" charset="0"/>
-                <a:cs typeface="Times New Roman" panose="02020603050405020304" pitchFamily="18" charset="0"/>
-              </a:rPr>
-              <a:t>serialport</a:t>
-            </a:r>
-            <a:r>
-              <a:rPr lang="pt-BR" dirty="0">
-                <a:ea typeface="Calibri" panose="020F0502020204030204" pitchFamily="34" charset="0"/>
-                <a:cs typeface="Times New Roman" panose="02020603050405020304" pitchFamily="18" charset="0"/>
-              </a:rPr>
-              <a:t> para o </a:t>
-            </a:r>
-            <a:r>
-              <a:rPr lang="pt-BR" i="1" dirty="0" err="1">
-                <a:ea typeface="Calibri" panose="020F0502020204030204" pitchFamily="34" charset="0"/>
-                <a:cs typeface="Times New Roman" panose="02020603050405020304" pitchFamily="18" charset="0"/>
-              </a:rPr>
-              <a:t>nodejs</a:t>
-            </a:r>
-            <a:r>
-              <a:rPr lang="pt-BR" dirty="0">
-                <a:ea typeface="Calibri" panose="020F0502020204030204" pitchFamily="34" charset="0"/>
-                <a:cs typeface="Times New Roman" panose="02020603050405020304" pitchFamily="18" charset="0"/>
-              </a:rPr>
-              <a:t>, implementar o código para </a:t>
-            </a:r>
-            <a:r>
-              <a:rPr lang="pt-BR" dirty="0" err="1">
-                <a:ea typeface="Calibri" panose="020F0502020204030204" pitchFamily="34" charset="0"/>
-                <a:cs typeface="Times New Roman" panose="02020603050405020304" pitchFamily="18" charset="0"/>
-              </a:rPr>
-              <a:t>Arduino</a:t>
-            </a:r>
-            <a:r>
-              <a:rPr lang="pt-BR" dirty="0">
-                <a:ea typeface="Calibri" panose="020F0502020204030204" pitchFamily="34" charset="0"/>
-                <a:cs typeface="Times New Roman" panose="02020603050405020304" pitchFamily="18" charset="0"/>
-              </a:rPr>
-              <a:t>, implementar o código para </a:t>
-            </a:r>
-            <a:r>
-              <a:rPr lang="pt-BR" i="1" dirty="0" err="1">
-                <a:ea typeface="Calibri" panose="020F0502020204030204" pitchFamily="34" charset="0"/>
-                <a:cs typeface="Times New Roman" panose="02020603050405020304" pitchFamily="18" charset="0"/>
-              </a:rPr>
-              <a:t>nodejs</a:t>
-            </a:r>
-            <a:endParaRPr lang="pt-BR" dirty="0">
-              <a:ea typeface="Calibri" panose="020F0502020204030204" pitchFamily="34" charset="0"/>
-              <a:cs typeface="Times New Roman" panose="02020603050405020304" pitchFamily="18" charset="0"/>
-            </a:endParaRPr>
-          </a:p>
-          <a:p>
-            <a:pPr algn="just">
-              <a:lnSpc>
-                <a:spcPct val="107000"/>
-              </a:lnSpc>
-              <a:spcAft>
-                <a:spcPts val="800"/>
-              </a:spcAft>
-            </a:pPr>
-            <a:r>
-              <a:rPr lang="pt-BR" dirty="0">
-                <a:ea typeface="Calibri" panose="020F0502020204030204" pitchFamily="34" charset="0"/>
-                <a:cs typeface="Times New Roman" panose="02020603050405020304" pitchFamily="18" charset="0"/>
-              </a:rPr>
-              <a:t>A comunicação com a internet acontece por meio de cabo USB, conectar o </a:t>
-            </a:r>
-            <a:r>
-              <a:rPr lang="pt-BR" dirty="0" err="1">
-                <a:ea typeface="Calibri" panose="020F0502020204030204" pitchFamily="34" charset="0"/>
-                <a:cs typeface="Times New Roman" panose="02020603050405020304" pitchFamily="18" charset="0"/>
-              </a:rPr>
-              <a:t>Arduino</a:t>
-            </a:r>
-            <a:r>
-              <a:rPr lang="pt-BR" dirty="0">
-                <a:ea typeface="Calibri" panose="020F0502020204030204" pitchFamily="34" charset="0"/>
-                <a:cs typeface="Times New Roman" panose="02020603050405020304" pitchFamily="18" charset="0"/>
-              </a:rPr>
-              <a:t> (depois dos sensores já conectados) a um computador com acesso à internet, e por meio de um aplicativo que se comunica com o servidor de banco de dados do </a:t>
-            </a:r>
-            <a:r>
-              <a:rPr lang="pt-BR" dirty="0" err="1">
-                <a:ea typeface="Calibri" panose="020F0502020204030204" pitchFamily="34" charset="0"/>
-                <a:cs typeface="Times New Roman" panose="02020603050405020304" pitchFamily="18" charset="0"/>
-              </a:rPr>
-              <a:t>Azure</a:t>
-            </a:r>
-            <a:r>
-              <a:rPr lang="pt-BR" dirty="0">
-                <a:ea typeface="Calibri" panose="020F0502020204030204" pitchFamily="34" charset="0"/>
-                <a:cs typeface="Times New Roman" panose="02020603050405020304" pitchFamily="18" charset="0"/>
-              </a:rPr>
-              <a:t>.</a:t>
-            </a:r>
-            <a:endParaRPr lang="pt-BR" dirty="0">
-              <a:effectLst/>
-              <a:ea typeface="Calibri" panose="020F0502020204030204" pitchFamily="34" charset="0"/>
-              <a:cs typeface="Times New Roman" panose="02020603050405020304" pitchFamily="18" charset="0"/>
-            </a:endParaRPr>
-          </a:p>
-        </p:txBody>
-      </p:sp>
-      <p:pic>
-        <p:nvPicPr>
-          <p:cNvPr id="1026" name="Picture 2" descr="Resultado de imagem para dht11"/>
-          <p:cNvPicPr>
-            <a:picLocks noChangeAspect="1" noChangeArrowheads="1"/>
-          </p:cNvPicPr>
-          <p:nvPr/>
-        </p:nvPicPr>
-        <p:blipFill>
-          <a:blip r:embed="rId2">
-            <a:extLst>
-              <a:ext uri="{28A0092B-C50C-407E-A947-70E740481C1C}">
-                <a14:useLocalDpi xmlns:a14="http://schemas.microsoft.com/office/drawing/2010/main" val="0"/>
-              </a:ext>
-            </a:extLst>
-          </a:blip>
-          <a:srcRect/>
-          <a:stretch>
-            <a:fillRect/>
-          </a:stretch>
-        </p:blipFill>
-        <p:spPr bwMode="auto">
-          <a:xfrm>
-            <a:off x="7934414" y="496151"/>
-            <a:ext cx="3231569" cy="2940728"/>
-          </a:xfrm>
-          <a:prstGeom prst="rect">
-            <a:avLst/>
-          </a:prstGeom>
-          <a:noFill/>
-          <a:extLst>
-            <a:ext uri="{909E8E84-426E-40DD-AFC4-6F175D3DCCD1}">
-              <a14:hiddenFill xmlns:a14="http://schemas.microsoft.com/office/drawing/2010/main">
-                <a:solidFill>
-                  <a:srgbClr val="FFFFFF"/>
-                </a:solidFill>
-              </a14:hiddenFill>
-            </a:ext>
-          </a:extLst>
-        </p:spPr>
-      </p:pic>
-      <p:pic>
-        <p:nvPicPr>
-          <p:cNvPr id="1028" name="Picture 4" descr="Resultado de imagem para dht11"/>
-          <p:cNvPicPr>
-            <a:picLocks noChangeAspect="1" noChangeArrowheads="1"/>
-          </p:cNvPicPr>
-          <p:nvPr/>
-        </p:nvPicPr>
-        <p:blipFill>
-          <a:blip r:embed="rId3" cstate="print">
-            <a:extLst>
-              <a:ext uri="{28A0092B-C50C-407E-A947-70E740481C1C}">
-                <a14:useLocalDpi xmlns:a14="http://schemas.microsoft.com/office/drawing/2010/main" val="0"/>
-              </a:ext>
-            </a:extLst>
-          </a:blip>
-          <a:srcRect/>
-          <a:stretch>
-            <a:fillRect/>
-          </a:stretch>
-        </p:blipFill>
-        <p:spPr bwMode="auto">
-          <a:xfrm>
-            <a:off x="910107" y="3992450"/>
-            <a:ext cx="5027458" cy="2560862"/>
-          </a:xfrm>
-          <a:prstGeom prst="rect">
-            <a:avLst/>
-          </a:prstGeom>
-          <a:noFill/>
-          <a:extLst>
-            <a:ext uri="{909E8E84-426E-40DD-AFC4-6F175D3DCCD1}">
-              <a14:hiddenFill xmlns:a14="http://schemas.microsoft.com/office/drawing/2010/main">
-                <a:solidFill>
-                  <a:srgbClr val="FFFFFF"/>
-                </a:solidFill>
-              </a14:hiddenFill>
-            </a:ext>
-          </a:extLst>
-        </p:spPr>
-      </p:pic>
-      <p:pic>
-        <p:nvPicPr>
-          <p:cNvPr id="1030" name="Picture 6" descr="Resultado de imagem para azure"/>
-          <p:cNvPicPr>
-            <a:picLocks noChangeAspect="1" noChangeArrowheads="1"/>
-          </p:cNvPicPr>
-          <p:nvPr/>
-        </p:nvPicPr>
-        <p:blipFill>
-          <a:blip r:embed="rId4">
-            <a:extLst>
-              <a:ext uri="{28A0092B-C50C-407E-A947-70E740481C1C}">
-                <a14:useLocalDpi xmlns:a14="http://schemas.microsoft.com/office/drawing/2010/main" val="0"/>
-              </a:ext>
-            </a:extLst>
-          </a:blip>
-          <a:srcRect/>
-          <a:stretch>
-            <a:fillRect/>
-          </a:stretch>
-        </p:blipFill>
-        <p:spPr bwMode="auto">
-          <a:xfrm>
-            <a:off x="7006107" y="3619503"/>
-            <a:ext cx="4107332" cy="2933809"/>
-          </a:xfrm>
-          <a:prstGeom prst="rect">
-            <a:avLst/>
-          </a:prstGeom>
-          <a:noFill/>
-          <a:extLst>
-            <a:ext uri="{909E8E84-426E-40DD-AFC4-6F175D3DCCD1}">
-              <a14:hiddenFill xmlns:a14="http://schemas.microsoft.com/office/drawing/2010/main">
-                <a:solidFill>
-                  <a:srgbClr val="FFFFFF"/>
-                </a:solidFill>
-              </a14:hiddenFill>
-            </a:ext>
-          </a:extLst>
-        </p:spPr>
-      </p:pic>
-    </p:spTree>
-    <p:extLst>
-      <p:ext uri="{BB962C8B-B14F-4D97-AF65-F5344CB8AC3E}">
-        <p14:creationId xmlns:p14="http://schemas.microsoft.com/office/powerpoint/2010/main" val="2518635241"/>
-      </p:ext>
-    </p:extLst>
-  </p:cSld>
-  <p:clrMapOvr>
-    <a:masterClrMapping/>
-  </p:clrMapOvr>
-  <p:timing>
-    <p:tnLst>
-      <p:par>
-        <p:cTn id="1" dur="indefinite" restart="never" nodeType="tmRoot"/>
-      </p:par>
-    </p:tnLst>
-  </p:timing>
-</p:sld>
-</file>
-
-<file path=ppt/slides/slide6.xml><?xml version="1.0" encoding="utf-8"?>
 <p:sld xmlns:a="http://schemas.openxmlformats.org/drawingml/2006/main" xmlns:r="http://schemas.openxmlformats.org/officeDocument/2006/relationships" xmlns:p="http://schemas.openxmlformats.org/presentationml/2006/main">
   <p:cSld>
     <p:spTree>
@@ -6223,6 +8085,59 @@
           </a:prstGeom>
         </p:spPr>
       </p:pic>
+      <p:sp>
+        <p:nvSpPr>
+          <p:cNvPr id="30" name="CaixaDeTexto 29"/>
+          <p:cNvSpPr txBox="1"/>
+          <p:nvPr/>
+        </p:nvSpPr>
+        <p:spPr>
+          <a:xfrm>
+            <a:off x="-196153" y="58061"/>
+            <a:ext cx="4021178" cy="1077218"/>
+          </a:xfrm>
+          <a:prstGeom prst="rect">
+            <a:avLst/>
+          </a:prstGeom>
+          <a:noFill/>
+        </p:spPr>
+        <p:txBody>
+          <a:bodyPr wrap="square" rtlCol="0">
+            <a:spAutoFit/>
+          </a:bodyPr>
+          <a:lstStyle/>
+          <a:p>
+            <a:pPr algn="ctr"/>
+            <a:r>
+              <a:rPr lang="pt-BR" sz="3200" b="1" u="sng" dirty="0" smtClean="0">
+                <a:solidFill>
+                  <a:prstClr val="black"/>
+                </a:solidFill>
+                <a:effectLst>
+                  <a:outerShdw blurRad="38100" dist="38100" dir="2700000" algn="tl">
+                    <a:srgbClr val="000000">
+                      <a:alpha val="43137"/>
+                    </a:srgbClr>
+                  </a:outerShdw>
+                </a:effectLst>
+              </a:rPr>
+              <a:t>Diagrama de Arquitetura HLD</a:t>
+            </a:r>
+            <a:endParaRPr lang="pt-BR" sz="3200" b="1" u="sng" dirty="0">
+              <a:solidFill>
+                <a:prstClr val="black"/>
+              </a:solidFill>
+              <a:effectLst>
+                <a:outerShdw blurRad="38100" dist="38100" dir="2700000" algn="tl">
+                  <a:srgbClr val="000000">
+                    <a:alpha val="43137"/>
+                  </a:srgbClr>
+                </a:outerShdw>
+              </a:effectLst>
+            </a:endParaRPr>
+          </a:p>
+        </p:txBody>
+      </p:sp>
     </p:spTree>
     <p:extLst>
       <p:ext uri="{BB962C8B-B14F-4D97-AF65-F5344CB8AC3E}">
@@ -6240,6 +8155,1210 @@
       </p:par>
     </p:tnLst>
   </p:timing>
+</p:sld>
+</file>
+
+<file path=ppt/slides/slide6.xml><?xml version="1.0" encoding="utf-8"?>
+<p:sld xmlns:a="http://schemas.openxmlformats.org/drawingml/2006/main" xmlns:r="http://schemas.openxmlformats.org/officeDocument/2006/relationships" xmlns:p="http://schemas.openxmlformats.org/presentationml/2006/main">
+  <p:cSld>
+    <p:spTree>
+      <p:nvGrpSpPr>
+        <p:cNvPr id="1" name=""/>
+        <p:cNvGrpSpPr/>
+        <p:nvPr/>
+      </p:nvGrpSpPr>
+      <p:grpSpPr>
+        <a:xfrm>
+          <a:off x="0" y="0"/>
+          <a:ext cx="0" cy="0"/>
+          <a:chOff x="0" y="0"/>
+          <a:chExt cx="0" cy="0"/>
+        </a:xfrm>
+      </p:grpSpPr>
+      <p:sp>
+        <p:nvSpPr>
+          <p:cNvPr id="4" name="Retângulo 3"/>
+          <p:cNvSpPr/>
+          <p:nvPr/>
+        </p:nvSpPr>
+        <p:spPr>
+          <a:xfrm>
+            <a:off x="910107" y="1031990"/>
+            <a:ext cx="6096000" cy="2862194"/>
+          </a:xfrm>
+          <a:prstGeom prst="rect">
+            <a:avLst/>
+          </a:prstGeom>
+        </p:spPr>
+        <p:txBody>
+          <a:bodyPr>
+            <a:spAutoFit/>
+          </a:bodyPr>
+          <a:lstStyle/>
+          <a:p>
+            <a:pPr algn="just">
+              <a:lnSpc>
+                <a:spcPct val="107000"/>
+              </a:lnSpc>
+              <a:spcAft>
+                <a:spcPts val="800"/>
+              </a:spcAft>
+            </a:pPr>
+            <a:r>
+              <a:rPr lang="pt-BR" dirty="0">
+                <a:ea typeface="Calibri" panose="020F0502020204030204" pitchFamily="34" charset="0"/>
+                <a:cs typeface="Times New Roman" panose="02020603050405020304" pitchFamily="18" charset="0"/>
+              </a:rPr>
+              <a:t>Conectar sensor </a:t>
+            </a:r>
+            <a:r>
+              <a:rPr lang="pt-BR" i="1" dirty="0">
+                <a:ea typeface="Calibri" panose="020F0502020204030204" pitchFamily="34" charset="0"/>
+                <a:cs typeface="Times New Roman" panose="02020603050405020304" pitchFamily="18" charset="0"/>
+              </a:rPr>
+              <a:t>DHT11</a:t>
+            </a:r>
+            <a:r>
+              <a:rPr lang="pt-BR" dirty="0">
+                <a:ea typeface="Calibri" panose="020F0502020204030204" pitchFamily="34" charset="0"/>
+                <a:cs typeface="Times New Roman" panose="02020603050405020304" pitchFamily="18" charset="0"/>
+              </a:rPr>
+              <a:t> ao </a:t>
+            </a:r>
+            <a:r>
+              <a:rPr lang="pt-BR" i="1" dirty="0" err="1">
+                <a:ea typeface="Calibri" panose="020F0502020204030204" pitchFamily="34" charset="0"/>
+                <a:cs typeface="Times New Roman" panose="02020603050405020304" pitchFamily="18" charset="0"/>
+              </a:rPr>
+              <a:t>Arduino</a:t>
+            </a:r>
+            <a:r>
+              <a:rPr lang="pt-BR" i="1" dirty="0">
+                <a:ea typeface="Calibri" panose="020F0502020204030204" pitchFamily="34" charset="0"/>
+                <a:cs typeface="Times New Roman" panose="02020603050405020304" pitchFamily="18" charset="0"/>
+              </a:rPr>
+              <a:t> UNO</a:t>
+            </a:r>
+            <a:r>
+              <a:rPr lang="pt-BR" dirty="0">
+                <a:ea typeface="Calibri" panose="020F0502020204030204" pitchFamily="34" charset="0"/>
+                <a:cs typeface="Times New Roman" panose="02020603050405020304" pitchFamily="18" charset="0"/>
+              </a:rPr>
+              <a:t>, instalar a biblioteca </a:t>
+            </a:r>
+            <a:r>
+              <a:rPr lang="pt-BR" i="1" dirty="0">
+                <a:ea typeface="Calibri" panose="020F0502020204030204" pitchFamily="34" charset="0"/>
+                <a:cs typeface="Times New Roman" panose="02020603050405020304" pitchFamily="18" charset="0"/>
+              </a:rPr>
+              <a:t>DHT11</a:t>
+            </a:r>
+            <a:r>
+              <a:rPr lang="pt-BR" dirty="0">
+                <a:ea typeface="Calibri" panose="020F0502020204030204" pitchFamily="34" charset="0"/>
+                <a:cs typeface="Times New Roman" panose="02020603050405020304" pitchFamily="18" charset="0"/>
+              </a:rPr>
+              <a:t> para o </a:t>
+            </a:r>
+            <a:r>
+              <a:rPr lang="pt-BR" i="1" dirty="0" err="1">
+                <a:ea typeface="Calibri" panose="020F0502020204030204" pitchFamily="34" charset="0"/>
+                <a:cs typeface="Times New Roman" panose="02020603050405020304" pitchFamily="18" charset="0"/>
+              </a:rPr>
+              <a:t>Arduino</a:t>
+            </a:r>
+            <a:r>
+              <a:rPr lang="pt-BR" dirty="0">
+                <a:ea typeface="Calibri" panose="020F0502020204030204" pitchFamily="34" charset="0"/>
+                <a:cs typeface="Times New Roman" panose="02020603050405020304" pitchFamily="18" charset="0"/>
+              </a:rPr>
+              <a:t>, instalar o modulo </a:t>
+            </a:r>
+            <a:r>
+              <a:rPr lang="pt-BR" i="1" dirty="0" err="1">
+                <a:ea typeface="Calibri" panose="020F0502020204030204" pitchFamily="34" charset="0"/>
+                <a:cs typeface="Times New Roman" panose="02020603050405020304" pitchFamily="18" charset="0"/>
+              </a:rPr>
+              <a:t>serialport</a:t>
+            </a:r>
+            <a:r>
+              <a:rPr lang="pt-BR" dirty="0">
+                <a:ea typeface="Calibri" panose="020F0502020204030204" pitchFamily="34" charset="0"/>
+                <a:cs typeface="Times New Roman" panose="02020603050405020304" pitchFamily="18" charset="0"/>
+              </a:rPr>
+              <a:t> para o </a:t>
+            </a:r>
+            <a:r>
+              <a:rPr lang="pt-BR" i="1" dirty="0" err="1">
+                <a:ea typeface="Calibri" panose="020F0502020204030204" pitchFamily="34" charset="0"/>
+                <a:cs typeface="Times New Roman" panose="02020603050405020304" pitchFamily="18" charset="0"/>
+              </a:rPr>
+              <a:t>nodejs</a:t>
+            </a:r>
+            <a:r>
+              <a:rPr lang="pt-BR" dirty="0">
+                <a:ea typeface="Calibri" panose="020F0502020204030204" pitchFamily="34" charset="0"/>
+                <a:cs typeface="Times New Roman" panose="02020603050405020304" pitchFamily="18" charset="0"/>
+              </a:rPr>
+              <a:t>, implementar o código para </a:t>
+            </a:r>
+            <a:r>
+              <a:rPr lang="pt-BR" i="1" dirty="0" err="1">
+                <a:ea typeface="Calibri" panose="020F0502020204030204" pitchFamily="34" charset="0"/>
+                <a:cs typeface="Times New Roman" panose="02020603050405020304" pitchFamily="18" charset="0"/>
+              </a:rPr>
+              <a:t>Arduino</a:t>
+            </a:r>
+            <a:r>
+              <a:rPr lang="pt-BR" dirty="0">
+                <a:ea typeface="Calibri" panose="020F0502020204030204" pitchFamily="34" charset="0"/>
+                <a:cs typeface="Times New Roman" panose="02020603050405020304" pitchFamily="18" charset="0"/>
+              </a:rPr>
+              <a:t>, implementar o código para </a:t>
+            </a:r>
+            <a:r>
+              <a:rPr lang="pt-BR" i="1" dirty="0" err="1" smtClean="0">
+                <a:ea typeface="Calibri" panose="020F0502020204030204" pitchFamily="34" charset="0"/>
+                <a:cs typeface="Times New Roman" panose="02020603050405020304" pitchFamily="18" charset="0"/>
+              </a:rPr>
+              <a:t>nodejs</a:t>
+            </a:r>
+            <a:r>
+              <a:rPr lang="pt-BR" i="1" dirty="0" smtClean="0">
+                <a:ea typeface="Calibri" panose="020F0502020204030204" pitchFamily="34" charset="0"/>
+                <a:cs typeface="Times New Roman" panose="02020603050405020304" pitchFamily="18" charset="0"/>
+              </a:rPr>
+              <a:t>.</a:t>
+            </a:r>
+            <a:endParaRPr lang="pt-BR" dirty="0">
+              <a:ea typeface="Calibri" panose="020F0502020204030204" pitchFamily="34" charset="0"/>
+              <a:cs typeface="Times New Roman" panose="02020603050405020304" pitchFamily="18" charset="0"/>
+            </a:endParaRPr>
+          </a:p>
+          <a:p>
+            <a:pPr algn="just">
+              <a:lnSpc>
+                <a:spcPct val="107000"/>
+              </a:lnSpc>
+              <a:spcAft>
+                <a:spcPts val="800"/>
+              </a:spcAft>
+            </a:pPr>
+            <a:r>
+              <a:rPr lang="pt-BR" dirty="0">
+                <a:ea typeface="Calibri" panose="020F0502020204030204" pitchFamily="34" charset="0"/>
+                <a:cs typeface="Times New Roman" panose="02020603050405020304" pitchFamily="18" charset="0"/>
+              </a:rPr>
+              <a:t>A comunicação com a internet acontece por meio de cabo USB, conectar o </a:t>
+            </a:r>
+            <a:r>
+              <a:rPr lang="pt-BR" i="1" dirty="0" err="1">
+                <a:ea typeface="Calibri" panose="020F0502020204030204" pitchFamily="34" charset="0"/>
+                <a:cs typeface="Times New Roman" panose="02020603050405020304" pitchFamily="18" charset="0"/>
+              </a:rPr>
+              <a:t>Arduino</a:t>
+            </a:r>
+            <a:r>
+              <a:rPr lang="pt-BR" dirty="0">
+                <a:ea typeface="Calibri" panose="020F0502020204030204" pitchFamily="34" charset="0"/>
+                <a:cs typeface="Times New Roman" panose="02020603050405020304" pitchFamily="18" charset="0"/>
+              </a:rPr>
+              <a:t> (depois dos sensores já conectados) a um computador com acesso à internet, e por meio </a:t>
+            </a:r>
+            <a:r>
+              <a:rPr lang="pt-BR" dirty="0" smtClean="0">
+                <a:ea typeface="Calibri" panose="020F0502020204030204" pitchFamily="34" charset="0"/>
+                <a:cs typeface="Times New Roman" panose="02020603050405020304" pitchFamily="18" charset="0"/>
+              </a:rPr>
+              <a:t>do aplicativo </a:t>
+            </a:r>
+            <a:r>
+              <a:rPr lang="pt-BR" i="1" dirty="0" err="1" smtClean="0">
+                <a:ea typeface="Calibri" panose="020F0502020204030204" pitchFamily="34" charset="0"/>
+                <a:cs typeface="Times New Roman" panose="02020603050405020304" pitchFamily="18" charset="0"/>
+              </a:rPr>
+              <a:t>nodejs</a:t>
+            </a:r>
+            <a:r>
+              <a:rPr lang="pt-BR" dirty="0" smtClean="0">
+                <a:ea typeface="Calibri" panose="020F0502020204030204" pitchFamily="34" charset="0"/>
+                <a:cs typeface="Times New Roman" panose="02020603050405020304" pitchFamily="18" charset="0"/>
+              </a:rPr>
+              <a:t> </a:t>
+            </a:r>
+            <a:r>
+              <a:rPr lang="pt-BR" dirty="0">
+                <a:ea typeface="Calibri" panose="020F0502020204030204" pitchFamily="34" charset="0"/>
+                <a:cs typeface="Times New Roman" panose="02020603050405020304" pitchFamily="18" charset="0"/>
+              </a:rPr>
+              <a:t>que se comunica com o servidor de banco de dados do </a:t>
+            </a:r>
+            <a:r>
+              <a:rPr lang="pt-BR" i="1" dirty="0" err="1">
+                <a:ea typeface="Calibri" panose="020F0502020204030204" pitchFamily="34" charset="0"/>
+                <a:cs typeface="Times New Roman" panose="02020603050405020304" pitchFamily="18" charset="0"/>
+              </a:rPr>
+              <a:t>Azure</a:t>
+            </a:r>
+            <a:r>
+              <a:rPr lang="pt-BR" dirty="0">
+                <a:ea typeface="Calibri" panose="020F0502020204030204" pitchFamily="34" charset="0"/>
+                <a:cs typeface="Times New Roman" panose="02020603050405020304" pitchFamily="18" charset="0"/>
+              </a:rPr>
+              <a:t>.</a:t>
+            </a:r>
+            <a:endParaRPr lang="pt-BR" dirty="0">
+              <a:effectLst/>
+              <a:ea typeface="Calibri" panose="020F0502020204030204" pitchFamily="34" charset="0"/>
+              <a:cs typeface="Times New Roman" panose="02020603050405020304" pitchFamily="18" charset="0"/>
+            </a:endParaRPr>
+          </a:p>
+        </p:txBody>
+      </p:sp>
+      <p:pic>
+        <p:nvPicPr>
+          <p:cNvPr id="1026" name="Picture 2" descr="Resultado de imagem para dht11"/>
+          <p:cNvPicPr>
+            <a:picLocks noChangeAspect="1" noChangeArrowheads="1"/>
+          </p:cNvPicPr>
+          <p:nvPr/>
+        </p:nvPicPr>
+        <p:blipFill>
+          <a:blip r:embed="rId2">
+            <a:extLst>
+              <a:ext uri="{28A0092B-C50C-407E-A947-70E740481C1C}">
+                <a14:useLocalDpi xmlns:a14="http://schemas.microsoft.com/office/drawing/2010/main" val="0"/>
+              </a:ext>
+            </a:extLst>
+          </a:blip>
+          <a:srcRect/>
+          <a:stretch>
+            <a:fillRect/>
+          </a:stretch>
+        </p:blipFill>
+        <p:spPr bwMode="auto">
+          <a:xfrm>
+            <a:off x="7934414" y="496151"/>
+            <a:ext cx="3231569" cy="2940728"/>
+          </a:xfrm>
+          <a:prstGeom prst="rect">
+            <a:avLst/>
+          </a:prstGeom>
+          <a:noFill/>
+          <a:extLst>
+            <a:ext uri="{909E8E84-426E-40DD-AFC4-6F175D3DCCD1}">
+              <a14:hiddenFill xmlns:a14="http://schemas.microsoft.com/office/drawing/2010/main">
+                <a:solidFill>
+                  <a:srgbClr val="FFFFFF"/>
+                </a:solidFill>
+              </a14:hiddenFill>
+            </a:ext>
+          </a:extLst>
+        </p:spPr>
+      </p:pic>
+      <p:pic>
+        <p:nvPicPr>
+          <p:cNvPr id="1028" name="Picture 4" descr="Resultado de imagem para dht11"/>
+          <p:cNvPicPr>
+            <a:picLocks noChangeAspect="1" noChangeArrowheads="1"/>
+          </p:cNvPicPr>
+          <p:nvPr/>
+        </p:nvPicPr>
+        <p:blipFill>
+          <a:blip r:embed="rId3" cstate="print">
+            <a:extLst>
+              <a:ext uri="{28A0092B-C50C-407E-A947-70E740481C1C}">
+                <a14:useLocalDpi xmlns:a14="http://schemas.microsoft.com/office/drawing/2010/main" val="0"/>
+              </a:ext>
+            </a:extLst>
+          </a:blip>
+          <a:srcRect/>
+          <a:stretch>
+            <a:fillRect/>
+          </a:stretch>
+        </p:blipFill>
+        <p:spPr bwMode="auto">
+          <a:xfrm>
+            <a:off x="910107" y="3992450"/>
+            <a:ext cx="5027458" cy="2560862"/>
+          </a:xfrm>
+          <a:prstGeom prst="rect">
+            <a:avLst/>
+          </a:prstGeom>
+          <a:noFill/>
+          <a:extLst>
+            <a:ext uri="{909E8E84-426E-40DD-AFC4-6F175D3DCCD1}">
+              <a14:hiddenFill xmlns:a14="http://schemas.microsoft.com/office/drawing/2010/main">
+                <a:solidFill>
+                  <a:srgbClr val="FFFFFF"/>
+                </a:solidFill>
+              </a14:hiddenFill>
+            </a:ext>
+          </a:extLst>
+        </p:spPr>
+      </p:pic>
+      <p:pic>
+        <p:nvPicPr>
+          <p:cNvPr id="1030" name="Picture 6" descr="Resultado de imagem para azure"/>
+          <p:cNvPicPr>
+            <a:picLocks noChangeAspect="1" noChangeArrowheads="1"/>
+          </p:cNvPicPr>
+          <p:nvPr/>
+        </p:nvPicPr>
+        <p:blipFill>
+          <a:blip r:embed="rId4">
+            <a:extLst>
+              <a:ext uri="{28A0092B-C50C-407E-A947-70E740481C1C}">
+                <a14:useLocalDpi xmlns:a14="http://schemas.microsoft.com/office/drawing/2010/main" val="0"/>
+              </a:ext>
+            </a:extLst>
+          </a:blip>
+          <a:srcRect/>
+          <a:stretch>
+            <a:fillRect/>
+          </a:stretch>
+        </p:blipFill>
+        <p:spPr bwMode="auto">
+          <a:xfrm>
+            <a:off x="8052984" y="3272581"/>
+            <a:ext cx="4139016" cy="2956440"/>
+          </a:xfrm>
+          <a:prstGeom prst="rect">
+            <a:avLst/>
+          </a:prstGeom>
+          <a:noFill/>
+          <a:extLst>
+            <a:ext uri="{909E8E84-426E-40DD-AFC4-6F175D3DCCD1}">
+              <a14:hiddenFill xmlns:a14="http://schemas.microsoft.com/office/drawing/2010/main">
+                <a:solidFill>
+                  <a:srgbClr val="FFFFFF"/>
+                </a:solidFill>
+              </a14:hiddenFill>
+            </a:ext>
+          </a:extLst>
+        </p:spPr>
+      </p:pic>
+      <p:pic>
+        <p:nvPicPr>
+          <p:cNvPr id="2" name="Picture 2" descr="Resultado de imagem para arduino icon"/>
+          <p:cNvPicPr>
+            <a:picLocks noChangeAspect="1" noChangeArrowheads="1"/>
+          </p:cNvPicPr>
+          <p:nvPr/>
+        </p:nvPicPr>
+        <p:blipFill>
+          <a:blip r:embed="rId5" cstate="print">
+            <a:extLst>
+              <a:ext uri="{28A0092B-C50C-407E-A947-70E740481C1C}">
+                <a14:useLocalDpi xmlns:a14="http://schemas.microsoft.com/office/drawing/2010/main" val="0"/>
+              </a:ext>
+            </a:extLst>
+          </a:blip>
+          <a:srcRect/>
+          <a:stretch>
+            <a:fillRect/>
+          </a:stretch>
+        </p:blipFill>
+        <p:spPr bwMode="auto">
+          <a:xfrm>
+            <a:off x="6229827" y="4245421"/>
+            <a:ext cx="1823157" cy="1316724"/>
+          </a:xfrm>
+          <a:prstGeom prst="rect">
+            <a:avLst/>
+          </a:prstGeom>
+          <a:noFill/>
+          <a:extLst>
+            <a:ext uri="{909E8E84-426E-40DD-AFC4-6F175D3DCCD1}">
+              <a14:hiddenFill xmlns:a14="http://schemas.microsoft.com/office/drawing/2010/main">
+                <a:solidFill>
+                  <a:srgbClr val="FFFFFF"/>
+                </a:solidFill>
+              </a14:hiddenFill>
+            </a:ext>
+          </a:extLst>
+        </p:spPr>
+      </p:pic>
+      <p:sp>
+        <p:nvSpPr>
+          <p:cNvPr id="7" name="CaixaDeTexto 6"/>
+          <p:cNvSpPr txBox="1"/>
+          <p:nvPr/>
+        </p:nvSpPr>
+        <p:spPr>
+          <a:xfrm>
+            <a:off x="666070" y="197689"/>
+            <a:ext cx="6584074" cy="584775"/>
+          </a:xfrm>
+          <a:prstGeom prst="rect">
+            <a:avLst/>
+          </a:prstGeom>
+          <a:noFill/>
+        </p:spPr>
+        <p:txBody>
+          <a:bodyPr wrap="square" rtlCol="0">
+            <a:spAutoFit/>
+          </a:bodyPr>
+          <a:lstStyle/>
+          <a:p>
+            <a:pPr algn="ctr"/>
+            <a:r>
+              <a:rPr lang="pt-BR" sz="3200" b="1" u="sng" dirty="0" smtClean="0">
+                <a:solidFill>
+                  <a:prstClr val="black"/>
+                </a:solidFill>
+                <a:effectLst>
+                  <a:outerShdw blurRad="38100" dist="38100" dir="2700000" algn="tl">
+                    <a:srgbClr val="000000">
+                      <a:alpha val="43137"/>
+                    </a:srgbClr>
+                  </a:outerShdw>
+                </a:effectLst>
+              </a:rPr>
+              <a:t>Processos da captura de dados</a:t>
+            </a:r>
+            <a:endParaRPr lang="pt-BR" sz="3200" b="1" u="sng" dirty="0">
+              <a:solidFill>
+                <a:prstClr val="black"/>
+              </a:solidFill>
+              <a:effectLst>
+                <a:outerShdw blurRad="38100" dist="38100" dir="2700000" algn="tl">
+                  <a:srgbClr val="000000">
+                    <a:alpha val="43137"/>
+                  </a:srgbClr>
+                </a:outerShdw>
+              </a:effectLst>
+            </a:endParaRPr>
+          </a:p>
+        </p:txBody>
+      </p:sp>
+      <p:pic>
+        <p:nvPicPr>
+          <p:cNvPr id="8" name="Picture 8" descr="Resultado de imagem para node js icon"/>
+          <p:cNvPicPr>
+            <a:picLocks noChangeAspect="1" noChangeArrowheads="1"/>
+          </p:cNvPicPr>
+          <p:nvPr/>
+        </p:nvPicPr>
+        <p:blipFill>
+          <a:blip r:embed="rId6" cstate="print">
+            <a:extLst>
+              <a:ext uri="{28A0092B-C50C-407E-A947-70E740481C1C}">
+                <a14:useLocalDpi xmlns:a14="http://schemas.microsoft.com/office/drawing/2010/main" val="0"/>
+              </a:ext>
+            </a:extLst>
+          </a:blip>
+          <a:srcRect/>
+          <a:stretch>
+            <a:fillRect/>
+          </a:stretch>
+        </p:blipFill>
+        <p:spPr bwMode="auto">
+          <a:xfrm>
+            <a:off x="7934414" y="5837117"/>
+            <a:ext cx="1444376" cy="884808"/>
+          </a:xfrm>
+          <a:prstGeom prst="rect">
+            <a:avLst/>
+          </a:prstGeom>
+          <a:noFill/>
+          <a:extLst>
+            <a:ext uri="{909E8E84-426E-40DD-AFC4-6F175D3DCCD1}">
+              <a14:hiddenFill xmlns:a14="http://schemas.microsoft.com/office/drawing/2010/main">
+                <a:solidFill>
+                  <a:srgbClr val="FFFFFF"/>
+                </a:solidFill>
+              </a14:hiddenFill>
+            </a:ext>
+          </a:extLst>
+        </p:spPr>
+      </p:pic>
+      <p:sp>
+        <p:nvSpPr>
+          <p:cNvPr id="9" name="CaixaDeTexto 8"/>
+          <p:cNvSpPr txBox="1"/>
+          <p:nvPr/>
+        </p:nvSpPr>
+        <p:spPr>
+          <a:xfrm>
+            <a:off x="9138065" y="295773"/>
+            <a:ext cx="824265" cy="369332"/>
+          </a:xfrm>
+          <a:prstGeom prst="rect">
+            <a:avLst/>
+          </a:prstGeom>
+          <a:noFill/>
+        </p:spPr>
+        <p:txBody>
+          <a:bodyPr wrap="none" rtlCol="0">
+            <a:spAutoFit/>
+          </a:bodyPr>
+          <a:lstStyle/>
+          <a:p>
+            <a:r>
+              <a:rPr lang="pt-BR" b="1" dirty="0" smtClean="0">
+                <a:effectLst>
+                  <a:outerShdw blurRad="38100" dist="38100" dir="2700000" algn="tl">
+                    <a:srgbClr val="000000">
+                      <a:alpha val="43137"/>
+                    </a:srgbClr>
+                  </a:outerShdw>
+                </a:effectLst>
+              </a:rPr>
+              <a:t>DHT11</a:t>
+            </a:r>
+            <a:endParaRPr lang="pt-BR" b="1" dirty="0">
+              <a:effectLst>
+                <a:outerShdw blurRad="38100" dist="38100" dir="2700000" algn="tl">
+                  <a:srgbClr val="000000">
+                    <a:alpha val="43137"/>
+                  </a:srgbClr>
+                </a:outerShdw>
+              </a:effectLst>
+            </a:endParaRPr>
+          </a:p>
+        </p:txBody>
+      </p:sp>
+    </p:spTree>
+    <p:extLst>
+      <p:ext uri="{BB962C8B-B14F-4D97-AF65-F5344CB8AC3E}">
+        <p14:creationId xmlns:p14="http://schemas.microsoft.com/office/powerpoint/2010/main" val="2518635241"/>
+      </p:ext>
+    </p:extLst>
+  </p:cSld>
+  <p:clrMapOvr>
+    <a:masterClrMapping/>
+  </p:clrMapOvr>
+  <p:timing>
+    <p:tnLst>
+      <p:par>
+        <p:cTn id="1" dur="indefinite" restart="never" nodeType="tmRoot"/>
+      </p:par>
+    </p:tnLst>
+  </p:timing>
+</p:sld>
+</file>
+
+<file path=ppt/slides/slide7.xml><?xml version="1.0" encoding="utf-8"?>
+<p:sld xmlns:a="http://schemas.openxmlformats.org/drawingml/2006/main" xmlns:r="http://schemas.openxmlformats.org/officeDocument/2006/relationships" xmlns:p="http://schemas.openxmlformats.org/presentationml/2006/main">
+  <p:cSld>
+    <p:spTree>
+      <p:nvGrpSpPr>
+        <p:cNvPr id="1" name=""/>
+        <p:cNvGrpSpPr/>
+        <p:nvPr/>
+      </p:nvGrpSpPr>
+      <p:grpSpPr>
+        <a:xfrm>
+          <a:off x="0" y="0"/>
+          <a:ext cx="0" cy="0"/>
+          <a:chOff x="0" y="0"/>
+          <a:chExt cx="0" cy="0"/>
+        </a:xfrm>
+      </p:grpSpPr>
+      <p:pic>
+        <p:nvPicPr>
+          <p:cNvPr id="4" name="Imagem 3" descr="C:\Users\Allan\Desktop\BD MH.jpg"/>
+          <p:cNvPicPr/>
+          <p:nvPr/>
+        </p:nvPicPr>
+        <p:blipFill>
+          <a:blip r:embed="rId2">
+            <a:extLst>
+              <a:ext uri="{28A0092B-C50C-407E-A947-70E740481C1C}">
+                <a14:useLocalDpi xmlns:a14="http://schemas.microsoft.com/office/drawing/2010/main" val="0"/>
+              </a:ext>
+            </a:extLst>
+          </a:blip>
+          <a:srcRect/>
+          <a:stretch>
+            <a:fillRect/>
+          </a:stretch>
+        </p:blipFill>
+        <p:spPr bwMode="auto">
+          <a:xfrm>
+            <a:off x="2067003" y="952097"/>
+            <a:ext cx="8055789" cy="5646808"/>
+          </a:xfrm>
+          <a:prstGeom prst="rect">
+            <a:avLst/>
+          </a:prstGeom>
+          <a:noFill/>
+          <a:ln>
+            <a:noFill/>
+          </a:ln>
+        </p:spPr>
+      </p:pic>
+      <p:sp>
+        <p:nvSpPr>
+          <p:cNvPr id="5" name="CaixaDeTexto 4"/>
+          <p:cNvSpPr txBox="1"/>
+          <p:nvPr/>
+        </p:nvSpPr>
+        <p:spPr>
+          <a:xfrm>
+            <a:off x="1454637" y="131141"/>
+            <a:ext cx="9282726" cy="769441"/>
+          </a:xfrm>
+          <a:prstGeom prst="rect">
+            <a:avLst/>
+          </a:prstGeom>
+          <a:noFill/>
+        </p:spPr>
+        <p:txBody>
+          <a:bodyPr wrap="square" rtlCol="0">
+            <a:spAutoFit/>
+          </a:bodyPr>
+          <a:lstStyle/>
+          <a:p>
+            <a:r>
+              <a:rPr lang="pt-BR" sz="4400" b="1" u="sng" dirty="0" smtClean="0">
+                <a:solidFill>
+                  <a:prstClr val="black"/>
+                </a:solidFill>
+                <a:effectLst>
+                  <a:outerShdw blurRad="38100" dist="38100" dir="2700000" algn="tl">
+                    <a:srgbClr val="000000">
+                      <a:alpha val="43137"/>
+                    </a:srgbClr>
+                  </a:outerShdw>
+                </a:effectLst>
+              </a:rPr>
+              <a:t>Arquitetura Conceitual Banco de Dados</a:t>
+            </a:r>
+            <a:endParaRPr lang="pt-BR" sz="4400" b="1" u="sng" dirty="0">
+              <a:solidFill>
+                <a:prstClr val="black"/>
+              </a:solidFill>
+              <a:effectLst>
+                <a:outerShdw blurRad="38100" dist="38100" dir="2700000" algn="tl">
+                  <a:srgbClr val="000000">
+                    <a:alpha val="43137"/>
+                  </a:srgbClr>
+                </a:outerShdw>
+              </a:effectLst>
+            </a:endParaRPr>
+          </a:p>
+        </p:txBody>
+      </p:sp>
+    </p:spTree>
+    <p:extLst>
+      <p:ext uri="{BB962C8B-B14F-4D97-AF65-F5344CB8AC3E}">
+        <p14:creationId xmlns:p14="http://schemas.microsoft.com/office/powerpoint/2010/main" val="2392916805"/>
+      </p:ext>
+    </p:extLst>
+  </p:cSld>
+  <p:clrMapOvr>
+    <a:masterClrMapping/>
+  </p:clrMapOvr>
+</p:sld>
+</file>
+
+<file path=ppt/slides/slide8.xml><?xml version="1.0" encoding="utf-8"?>
+<p:sld xmlns:a="http://schemas.openxmlformats.org/drawingml/2006/main" xmlns:r="http://schemas.openxmlformats.org/officeDocument/2006/relationships" xmlns:p="http://schemas.openxmlformats.org/presentationml/2006/main">
+  <p:cSld>
+    <p:spTree>
+      <p:nvGrpSpPr>
+        <p:cNvPr id="1" name=""/>
+        <p:cNvGrpSpPr/>
+        <p:nvPr/>
+      </p:nvGrpSpPr>
+      <p:grpSpPr>
+        <a:xfrm>
+          <a:off x="0" y="0"/>
+          <a:ext cx="0" cy="0"/>
+          <a:chOff x="0" y="0"/>
+          <a:chExt cx="0" cy="0"/>
+        </a:xfrm>
+      </p:grpSpPr>
+      <p:pic>
+        <p:nvPicPr>
+          <p:cNvPr id="5" name="Imagem 4"/>
+          <p:cNvPicPr>
+            <a:picLocks noChangeAspect="1"/>
+          </p:cNvPicPr>
+          <p:nvPr/>
+        </p:nvPicPr>
+        <p:blipFill>
+          <a:blip r:embed="rId2">
+            <a:extLst>
+              <a:ext uri="{28A0092B-C50C-407E-A947-70E740481C1C}">
+                <a14:useLocalDpi xmlns:a14="http://schemas.microsoft.com/office/drawing/2010/main" val="0"/>
+              </a:ext>
+            </a:extLst>
+          </a:blip>
+          <a:stretch>
+            <a:fillRect/>
+          </a:stretch>
+        </p:blipFill>
+        <p:spPr>
+          <a:xfrm>
+            <a:off x="3107732" y="614953"/>
+            <a:ext cx="5976536" cy="5985469"/>
+          </a:xfrm>
+          <a:prstGeom prst="rect">
+            <a:avLst/>
+          </a:prstGeom>
+        </p:spPr>
+      </p:pic>
+      <p:sp>
+        <p:nvSpPr>
+          <p:cNvPr id="4" name="CaixaDeTexto 3"/>
+          <p:cNvSpPr txBox="1"/>
+          <p:nvPr/>
+        </p:nvSpPr>
+        <p:spPr>
+          <a:xfrm>
+            <a:off x="1937595" y="131141"/>
+            <a:ext cx="8316811" cy="769441"/>
+          </a:xfrm>
+          <a:prstGeom prst="rect">
+            <a:avLst/>
+          </a:prstGeom>
+          <a:noFill/>
+        </p:spPr>
+        <p:txBody>
+          <a:bodyPr wrap="square" rtlCol="0">
+            <a:spAutoFit/>
+          </a:bodyPr>
+          <a:lstStyle/>
+          <a:p>
+            <a:r>
+              <a:rPr lang="pt-BR" sz="4400" b="1" u="sng" dirty="0" smtClean="0">
+                <a:solidFill>
+                  <a:prstClr val="black"/>
+                </a:solidFill>
+                <a:effectLst>
+                  <a:outerShdw blurRad="38100" dist="38100" dir="2700000" algn="tl">
+                    <a:srgbClr val="000000">
+                      <a:alpha val="43137"/>
+                    </a:srgbClr>
+                  </a:outerShdw>
+                </a:effectLst>
+              </a:rPr>
+              <a:t>Arquitetura Lógica Banco de Dados</a:t>
+            </a:r>
+            <a:endParaRPr lang="pt-BR" sz="4400" b="1" u="sng" dirty="0">
+              <a:solidFill>
+                <a:prstClr val="black"/>
+              </a:solidFill>
+              <a:effectLst>
+                <a:outerShdw blurRad="38100" dist="38100" dir="2700000" algn="tl">
+                  <a:srgbClr val="000000">
+                    <a:alpha val="43137"/>
+                  </a:srgbClr>
+                </a:outerShdw>
+              </a:effectLst>
+            </a:endParaRPr>
+          </a:p>
+        </p:txBody>
+      </p:sp>
+    </p:spTree>
+    <p:extLst>
+      <p:ext uri="{BB962C8B-B14F-4D97-AF65-F5344CB8AC3E}">
+        <p14:creationId xmlns:p14="http://schemas.microsoft.com/office/powerpoint/2010/main" val="2742970303"/>
+      </p:ext>
+    </p:extLst>
+  </p:cSld>
+  <p:clrMapOvr>
+    <a:masterClrMapping/>
+  </p:clrMapOvr>
+</p:sld>
+</file>
+
+<file path=ppt/slides/slide9.xml><?xml version="1.0" encoding="utf-8"?>
+<p:sld xmlns:a="http://schemas.openxmlformats.org/drawingml/2006/main" xmlns:r="http://schemas.openxmlformats.org/officeDocument/2006/relationships" xmlns:p="http://schemas.openxmlformats.org/presentationml/2006/main">
+  <p:cSld>
+    <p:spTree>
+      <p:nvGrpSpPr>
+        <p:cNvPr id="1" name=""/>
+        <p:cNvGrpSpPr/>
+        <p:nvPr/>
+      </p:nvGrpSpPr>
+      <p:grpSpPr>
+        <a:xfrm>
+          <a:off x="0" y="0"/>
+          <a:ext cx="0" cy="0"/>
+          <a:chOff x="0" y="0"/>
+          <a:chExt cx="0" cy="0"/>
+        </a:xfrm>
+      </p:grpSpPr>
+      <p:sp>
+        <p:nvSpPr>
+          <p:cNvPr id="4" name="CaixaDeTexto 3"/>
+          <p:cNvSpPr txBox="1"/>
+          <p:nvPr/>
+        </p:nvSpPr>
+        <p:spPr>
+          <a:xfrm>
+            <a:off x="3787184" y="0"/>
+            <a:ext cx="4617633" cy="769441"/>
+          </a:xfrm>
+          <a:prstGeom prst="rect">
+            <a:avLst/>
+          </a:prstGeom>
+          <a:noFill/>
+        </p:spPr>
+        <p:txBody>
+          <a:bodyPr wrap="square" rtlCol="0">
+            <a:spAutoFit/>
+          </a:bodyPr>
+          <a:lstStyle/>
+          <a:p>
+            <a:r>
+              <a:rPr lang="pt-BR" sz="4400" b="1" u="sng" dirty="0" smtClean="0">
+                <a:solidFill>
+                  <a:prstClr val="black"/>
+                </a:solidFill>
+                <a:effectLst>
+                  <a:outerShdw blurRad="38100" dist="38100" dir="2700000" algn="tl">
+                    <a:srgbClr val="000000">
+                      <a:alpha val="43137"/>
+                    </a:srgbClr>
+                  </a:outerShdw>
+                </a:effectLst>
+              </a:rPr>
+              <a:t>Protótipos de Telas</a:t>
+            </a:r>
+            <a:endParaRPr lang="pt-BR" sz="4400" b="1" u="sng" dirty="0">
+              <a:solidFill>
+                <a:prstClr val="black"/>
+              </a:solidFill>
+              <a:effectLst>
+                <a:outerShdw blurRad="38100" dist="38100" dir="2700000" algn="tl">
+                  <a:srgbClr val="000000">
+                    <a:alpha val="43137"/>
+                  </a:srgbClr>
+                </a:outerShdw>
+              </a:effectLst>
+            </a:endParaRPr>
+          </a:p>
+        </p:txBody>
+      </p:sp>
+      <p:sp>
+        <p:nvSpPr>
+          <p:cNvPr id="5" name="CaixaDeTexto 4"/>
+          <p:cNvSpPr txBox="1"/>
+          <p:nvPr/>
+        </p:nvSpPr>
+        <p:spPr>
+          <a:xfrm>
+            <a:off x="5553223" y="596275"/>
+            <a:ext cx="1085554" cy="646331"/>
+          </a:xfrm>
+          <a:prstGeom prst="rect">
+            <a:avLst/>
+          </a:prstGeom>
+          <a:noFill/>
+        </p:spPr>
+        <p:txBody>
+          <a:bodyPr wrap="none" rtlCol="0">
+            <a:spAutoFit/>
+          </a:bodyPr>
+          <a:lstStyle/>
+          <a:p>
+            <a:r>
+              <a:rPr lang="pt-BR" sz="3600" b="1" dirty="0" smtClean="0">
+                <a:effectLst>
+                  <a:outerShdw blurRad="38100" dist="38100" dir="2700000" algn="tl">
+                    <a:srgbClr val="000000">
+                      <a:alpha val="43137"/>
+                    </a:srgbClr>
+                  </a:outerShdw>
+                </a:effectLst>
+              </a:rPr>
+              <a:t>WEB</a:t>
+            </a:r>
+            <a:endParaRPr lang="pt-BR" sz="3600" b="1" dirty="0">
+              <a:effectLst>
+                <a:outerShdw blurRad="38100" dist="38100" dir="2700000" algn="tl">
+                  <a:srgbClr val="000000">
+                    <a:alpha val="43137"/>
+                  </a:srgbClr>
+                </a:outerShdw>
+              </a:effectLst>
+            </a:endParaRPr>
+          </a:p>
+        </p:txBody>
+      </p:sp>
+      <p:pic>
+        <p:nvPicPr>
+          <p:cNvPr id="6" name="Imagem 5"/>
+          <p:cNvPicPr>
+            <a:picLocks noChangeAspect="1"/>
+          </p:cNvPicPr>
+          <p:nvPr/>
+        </p:nvPicPr>
+        <p:blipFill>
+          <a:blip r:embed="rId2">
+            <a:extLst>
+              <a:ext uri="{28A0092B-C50C-407E-A947-70E740481C1C}">
+                <a14:useLocalDpi xmlns:a14="http://schemas.microsoft.com/office/drawing/2010/main" val="0"/>
+              </a:ext>
+            </a:extLst>
+          </a:blip>
+          <a:stretch>
+            <a:fillRect/>
+          </a:stretch>
+        </p:blipFill>
+        <p:spPr>
+          <a:xfrm>
+            <a:off x="756579" y="1384275"/>
+            <a:ext cx="4703097" cy="2486316"/>
+          </a:xfrm>
+          <a:prstGeom prst="rect">
+            <a:avLst/>
+          </a:prstGeom>
+        </p:spPr>
+      </p:pic>
+      <p:pic>
+        <p:nvPicPr>
+          <p:cNvPr id="9" name="Imagem 8"/>
+          <p:cNvPicPr>
+            <a:picLocks noChangeAspect="1"/>
+          </p:cNvPicPr>
+          <p:nvPr/>
+        </p:nvPicPr>
+        <p:blipFill>
+          <a:blip r:embed="rId3">
+            <a:extLst>
+              <a:ext uri="{28A0092B-C50C-407E-A947-70E740481C1C}">
+                <a14:useLocalDpi xmlns:a14="http://schemas.microsoft.com/office/drawing/2010/main" val="0"/>
+              </a:ext>
+            </a:extLst>
+          </a:blip>
+          <a:stretch>
+            <a:fillRect/>
+          </a:stretch>
+        </p:blipFill>
+        <p:spPr>
+          <a:xfrm>
+            <a:off x="6546194" y="4268712"/>
+            <a:ext cx="4824113" cy="2486316"/>
+          </a:xfrm>
+          <a:prstGeom prst="rect">
+            <a:avLst/>
+          </a:prstGeom>
+        </p:spPr>
+      </p:pic>
+      <p:pic>
+        <p:nvPicPr>
+          <p:cNvPr id="10" name="Imagem 9"/>
+          <p:cNvPicPr>
+            <a:picLocks noChangeAspect="1"/>
+          </p:cNvPicPr>
+          <p:nvPr/>
+        </p:nvPicPr>
+        <p:blipFill>
+          <a:blip r:embed="rId4">
+            <a:extLst>
+              <a:ext uri="{28A0092B-C50C-407E-A947-70E740481C1C}">
+                <a14:useLocalDpi xmlns:a14="http://schemas.microsoft.com/office/drawing/2010/main" val="0"/>
+              </a:ext>
+            </a:extLst>
+          </a:blip>
+          <a:stretch>
+            <a:fillRect/>
+          </a:stretch>
+        </p:blipFill>
+        <p:spPr>
+          <a:xfrm>
+            <a:off x="756579" y="4268712"/>
+            <a:ext cx="4703097" cy="2486316"/>
+          </a:xfrm>
+          <a:prstGeom prst="rect">
+            <a:avLst/>
+          </a:prstGeom>
+        </p:spPr>
+      </p:pic>
+      <p:pic>
+        <p:nvPicPr>
+          <p:cNvPr id="11" name="Imagem 10"/>
+          <p:cNvPicPr>
+            <a:picLocks noChangeAspect="1"/>
+          </p:cNvPicPr>
+          <p:nvPr/>
+        </p:nvPicPr>
+        <p:blipFill>
+          <a:blip r:embed="rId5">
+            <a:extLst>
+              <a:ext uri="{28A0092B-C50C-407E-A947-70E740481C1C}">
+                <a14:useLocalDpi xmlns:a14="http://schemas.microsoft.com/office/drawing/2010/main" val="0"/>
+              </a:ext>
+            </a:extLst>
+          </a:blip>
+          <a:stretch>
+            <a:fillRect/>
+          </a:stretch>
+        </p:blipFill>
+        <p:spPr>
+          <a:xfrm>
+            <a:off x="6546195" y="1384275"/>
+            <a:ext cx="4824113" cy="2486316"/>
+          </a:xfrm>
+          <a:prstGeom prst="rect">
+            <a:avLst/>
+          </a:prstGeom>
+        </p:spPr>
+      </p:pic>
+      <p:sp>
+        <p:nvSpPr>
+          <p:cNvPr id="12" name="CaixaDeTexto 11"/>
+          <p:cNvSpPr txBox="1"/>
+          <p:nvPr/>
+        </p:nvSpPr>
+        <p:spPr>
+          <a:xfrm>
+            <a:off x="1000760" y="1014943"/>
+            <a:ext cx="3893212" cy="369332"/>
+          </a:xfrm>
+          <a:prstGeom prst="rect">
+            <a:avLst/>
+          </a:prstGeom>
+          <a:noFill/>
+        </p:spPr>
+        <p:txBody>
+          <a:bodyPr wrap="square" rtlCol="0">
+            <a:spAutoFit/>
+          </a:bodyPr>
+          <a:lstStyle/>
+          <a:p>
+            <a:r>
+              <a:rPr lang="pt-BR" b="1" dirty="0" smtClean="0"/>
+              <a:t>Tela inicial</a:t>
+            </a:r>
+            <a:r>
+              <a:rPr lang="pt-BR" dirty="0"/>
+              <a:t> </a:t>
+            </a:r>
+            <a:r>
+              <a:rPr lang="pt-BR" dirty="0" smtClean="0"/>
+              <a:t>- Apresentação da aplicação.</a:t>
+            </a:r>
+            <a:endParaRPr lang="pt-BR" dirty="0"/>
+          </a:p>
+        </p:txBody>
+      </p:sp>
+      <p:sp>
+        <p:nvSpPr>
+          <p:cNvPr id="13" name="CaixaDeTexto 12"/>
+          <p:cNvSpPr txBox="1"/>
+          <p:nvPr/>
+        </p:nvSpPr>
+        <p:spPr>
+          <a:xfrm>
+            <a:off x="6546195" y="1014943"/>
+            <a:ext cx="5501707" cy="369332"/>
+          </a:xfrm>
+          <a:prstGeom prst="rect">
+            <a:avLst/>
+          </a:prstGeom>
+          <a:noFill/>
+        </p:spPr>
+        <p:txBody>
+          <a:bodyPr wrap="square" rtlCol="0">
+            <a:spAutoFit/>
+          </a:bodyPr>
+          <a:lstStyle/>
+          <a:p>
+            <a:r>
+              <a:rPr lang="pt-BR" b="1" dirty="0" smtClean="0"/>
+              <a:t>Monitoramento </a:t>
+            </a:r>
+            <a:r>
+              <a:rPr lang="pt-BR" dirty="0" smtClean="0"/>
+              <a:t>- Esboço da funcionalidade principal.</a:t>
+            </a:r>
+            <a:endParaRPr lang="pt-BR" dirty="0"/>
+          </a:p>
+        </p:txBody>
+      </p:sp>
+      <p:sp>
+        <p:nvSpPr>
+          <p:cNvPr id="14" name="CaixaDeTexto 13"/>
+          <p:cNvSpPr txBox="1"/>
+          <p:nvPr/>
+        </p:nvSpPr>
+        <p:spPr>
+          <a:xfrm>
+            <a:off x="1085448" y="3863144"/>
+            <a:ext cx="3893212" cy="369332"/>
+          </a:xfrm>
+          <a:prstGeom prst="rect">
+            <a:avLst/>
+          </a:prstGeom>
+          <a:noFill/>
+        </p:spPr>
+        <p:txBody>
+          <a:bodyPr wrap="square" rtlCol="0">
+            <a:spAutoFit/>
+          </a:bodyPr>
+          <a:lstStyle/>
+          <a:p>
+            <a:r>
+              <a:rPr lang="pt-BR" b="1" dirty="0" err="1" smtClean="0"/>
+              <a:t>Login</a:t>
+            </a:r>
+            <a:r>
+              <a:rPr lang="pt-BR" b="1" dirty="0" smtClean="0"/>
+              <a:t> </a:t>
+            </a:r>
+            <a:r>
+              <a:rPr lang="pt-BR" dirty="0" smtClean="0"/>
+              <a:t>- Formulário de acesso padrão.</a:t>
+            </a:r>
+            <a:endParaRPr lang="pt-BR" dirty="0"/>
+          </a:p>
+        </p:txBody>
+      </p:sp>
+      <p:sp>
+        <p:nvSpPr>
+          <p:cNvPr id="15" name="CaixaDeTexto 14"/>
+          <p:cNvSpPr txBox="1"/>
+          <p:nvPr/>
+        </p:nvSpPr>
+        <p:spPr>
+          <a:xfrm>
+            <a:off x="6388024" y="3870591"/>
+            <a:ext cx="5818048" cy="369332"/>
+          </a:xfrm>
+          <a:prstGeom prst="rect">
+            <a:avLst/>
+          </a:prstGeom>
+          <a:noFill/>
+        </p:spPr>
+        <p:txBody>
+          <a:bodyPr wrap="square" rtlCol="0">
+            <a:spAutoFit/>
+          </a:bodyPr>
+          <a:lstStyle/>
+          <a:p>
+            <a:r>
+              <a:rPr lang="pt-BR" sz="1400" b="1" dirty="0" smtClean="0"/>
+              <a:t>Cadastro de monitor </a:t>
+            </a:r>
+            <a:r>
+              <a:rPr lang="pt-BR" sz="1400" dirty="0" smtClean="0"/>
+              <a:t>- Somente o Administrador é autorizado realiza-lo</a:t>
+            </a:r>
+            <a:r>
+              <a:rPr lang="pt-BR" dirty="0" smtClean="0"/>
+              <a:t>.</a:t>
+            </a:r>
+            <a:endParaRPr lang="pt-BR" dirty="0"/>
+          </a:p>
+        </p:txBody>
+      </p:sp>
+    </p:spTree>
+    <p:extLst>
+      <p:ext uri="{BB962C8B-B14F-4D97-AF65-F5344CB8AC3E}">
+        <p14:creationId xmlns:p14="http://schemas.microsoft.com/office/powerpoint/2010/main" val="1329507235"/>
+      </p:ext>
+    </p:extLst>
+  </p:cSld>
+  <p:clrMapOvr>
+    <a:masterClrMapping/>
+  </p:clrMapOvr>
 </p:sld>
 </file>
 

</xml_diff>

<commit_message>
Atualização Apresentação Projeto - pós verificação da Profa Marise
</commit_message>
<xml_diff>
--- a/Apresentação MonkeysTest.pptx
+++ b/Apresentação MonkeysTest.pptx
@@ -6847,36 +6847,6 @@
           </a:p>
         </p:txBody>
       </p:sp>
-      <p:pic>
-        <p:nvPicPr>
-          <p:cNvPr id="45" name="Imagem 44"/>
-          <p:cNvPicPr>
-            <a:picLocks noChangeAspect="1"/>
-          </p:cNvPicPr>
-          <p:nvPr/>
-        </p:nvPicPr>
-        <p:blipFill>
-          <a:blip r:embed="rId11">
-            <a:extLst>
-              <a:ext uri="{28A0092B-C50C-407E-A947-70E740481C1C}">
-                <a14:useLocalDpi xmlns:a14="http://schemas.microsoft.com/office/drawing/2010/main" val="0"/>
-              </a:ext>
-            </a:extLst>
-          </a:blip>
-          <a:stretch>
-            <a:fillRect/>
-          </a:stretch>
-        </p:blipFill>
-        <p:spPr>
-          <a:xfrm>
-            <a:off x="9545588" y="360863"/>
-            <a:ext cx="1905000" cy="1905000"/>
-          </a:xfrm>
-          <a:prstGeom prst="rect">
-            <a:avLst/>
-          </a:prstGeom>
-        </p:spPr>
-      </p:pic>
       <p:cxnSp>
         <p:nvCxnSpPr>
           <p:cNvPr id="50" name="Conector angulado 49"/>
@@ -7003,6 +6973,47 @@
           </a:p>
         </p:txBody>
       </p:sp>
+      <p:pic>
+        <p:nvPicPr>
+          <p:cNvPr id="26" name="Picture 2" descr="Resultado de imagem para scientist icon"/>
+          <p:cNvPicPr>
+            <a:picLocks noChangeAspect="1" noChangeArrowheads="1"/>
+          </p:cNvPicPr>
+          <p:nvPr/>
+        </p:nvPicPr>
+        <p:blipFill>
+          <a:blip r:embed="rId11">
+            <a:extLst>
+              <a:ext uri="{28A0092B-C50C-407E-A947-70E740481C1C}">
+                <a14:useLocalDpi xmlns:a14="http://schemas.microsoft.com/office/drawing/2010/main" val="0"/>
+              </a:ext>
+            </a:extLst>
+          </a:blip>
+          <a:srcRect/>
+          <a:stretch>
+            <a:fillRect/>
+          </a:stretch>
+        </p:blipFill>
+        <p:spPr bwMode="auto">
+          <a:xfrm>
+            <a:off x="9094123" y="-122408"/>
+            <a:ext cx="2473741" cy="2473742"/>
+          </a:xfrm>
+          <a:prstGeom prst="rect">
+            <a:avLst/>
+          </a:prstGeom>
+          <a:noFill/>
+          <a:extLst>
+            <a:ext uri="{909E8E84-426E-40DD-AFC4-6F175D3DCCD1}">
+              <a14:hiddenFill xmlns:a14="http://schemas.microsoft.com/office/drawing/2010/main">
+                <a:solidFill>
+                  <a:srgbClr val="FFFFFF"/>
+                </a:solidFill>
+              </a14:hiddenFill>
+            </a:ext>
+          </a:extLst>
+        </p:spPr>
+      </p:pic>
     </p:spTree>
     <p:extLst>
       <p:ext uri="{BB962C8B-B14F-4D97-AF65-F5344CB8AC3E}">

</xml_diff>